<commit_message>
Added content to presentation slides
</commit_message>
<xml_diff>
--- a/Team Xy Presentation.pptx
+++ b/Team Xy Presentation.pptx
@@ -3451,7 +3451,10 @@
             <a:rPr lang="en-CA" sz="900" dirty="0" err="1"/>
             <a:t>Findspark</a:t>
           </a:r>
-          <a:endParaRPr lang="en-CA" sz="900" dirty="0"/>
+          <a:r>
+            <a:rPr lang="en-CA" sz="900" dirty="0"/>
+            <a:t>.</a:t>
+          </a:r>
         </a:p>
       </dgm:t>
     </dgm:pt>
@@ -3527,7 +3530,7 @@
           </a:pPr>
           <a:r>
             <a:rPr lang="en-CA" sz="1000" i="0" dirty="0"/>
-            <a:t>Read data from DB</a:t>
+            <a:t>Read data from DB.</a:t>
           </a:r>
         </a:p>
       </dgm:t>
@@ -3567,7 +3570,7 @@
           </a:pPr>
           <a:r>
             <a:rPr lang="en-CA" sz="1000" dirty="0"/>
-            <a:t>Pull tables from DB</a:t>
+            <a:t>Pull tables from DB.</a:t>
           </a:r>
         </a:p>
       </dgm:t>
@@ -3643,7 +3646,7 @@
           </a:pPr>
           <a:r>
             <a:rPr lang="en-CA" sz="1000" dirty="0"/>
-            <a:t>Categorize into binary categories (binary) / Drop rows with 2 and 4 stars (3-category) / Keep all rows (5-category)</a:t>
+            <a:t>Categorize into binary categories (binary) / Drop rows with 2 and 4 stars (3-category) / Keep all rows (5-category).</a:t>
           </a:r>
         </a:p>
       </dgm:t>
@@ -3683,7 +3686,7 @@
           </a:pPr>
           <a:r>
             <a:rPr lang="en-CA" sz="1000" dirty="0"/>
-            <a:t>Remove punctuation</a:t>
+            <a:t>Remove punctuation.</a:t>
           </a:r>
         </a:p>
       </dgm:t>
@@ -3723,7 +3726,7 @@
           </a:pPr>
           <a:r>
             <a:rPr lang="en-CA" sz="900" dirty="0"/>
-            <a:t>Set Environment Variables</a:t>
+            <a:t>Set environment variables.</a:t>
           </a:r>
         </a:p>
       </dgm:t>
@@ -3763,7 +3766,15 @@
           </a:pPr>
           <a:r>
             <a:rPr lang="en-CA" sz="900" dirty="0"/>
-            <a:t>Start a SparkSession</a:t>
+            <a:t>Start a </a:t>
+          </a:r>
+          <a:r>
+            <a:rPr lang="en-CA" sz="900" dirty="0" err="1"/>
+            <a:t>SparkSession</a:t>
+          </a:r>
+          <a:r>
+            <a:rPr lang="en-CA" sz="900" dirty="0"/>
+            <a:t>.</a:t>
           </a:r>
         </a:p>
       </dgm:t>
@@ -3803,7 +3814,7 @@
           </a:pPr>
           <a:r>
             <a:rPr lang="en-CA" sz="900" dirty="0"/>
-            <a:t>Interact with SQL</a:t>
+            <a:t>Interact with SQL.</a:t>
           </a:r>
         </a:p>
       </dgm:t>
@@ -3843,7 +3854,7 @@
           </a:pPr>
           <a:r>
             <a:rPr lang="en-CA" sz="900" dirty="0"/>
-            <a:t>Create Spark application</a:t>
+            <a:t>Create Spark application.</a:t>
           </a:r>
         </a:p>
       </dgm:t>
@@ -3883,7 +3894,15 @@
           </a:pPr>
           <a:r>
             <a:rPr lang="en-US" sz="900" dirty="0"/>
-            <a:t>gcloud login and check the DB</a:t>
+            <a:t>Login to </a:t>
+          </a:r>
+          <a:r>
+            <a:rPr lang="en-US" sz="900" dirty="0" err="1"/>
+            <a:t>gcloud</a:t>
+          </a:r>
+          <a:r>
+            <a:rPr lang="en-US" sz="900" dirty="0"/>
+            <a:t> and check the DB.</a:t>
           </a:r>
           <a:endParaRPr lang="en-CA" sz="900" dirty="0"/>
         </a:p>
@@ -3924,7 +3943,7 @@
           </a:pPr>
           <a:r>
             <a:rPr lang="en-US" sz="900" dirty="0"/>
-            <a:t>download and initialize the SQL proxy</a:t>
+            <a:t>Download and initialize the SQL proxy.</a:t>
           </a:r>
           <a:endParaRPr lang="en-CA" sz="900" dirty="0"/>
         </a:p>
@@ -3965,7 +3984,7 @@
           </a:pPr>
           <a:r>
             <a:rPr lang="en-CA" sz="900" dirty="0"/>
-            <a:t>Configure settings for RDS</a:t>
+            <a:t>Configure settings for RDS.</a:t>
           </a:r>
         </a:p>
       </dgm:t>
@@ -4019,7 +4038,10 @@
             <a:rPr lang="en-CA" sz="1000" dirty="0" err="1"/>
             <a:t>DataFrame</a:t>
           </a:r>
-          <a:endParaRPr lang="en-CA" sz="1000" dirty="0"/>
+          <a:r>
+            <a:rPr lang="en-CA" sz="1000" dirty="0"/>
+            <a:t>.</a:t>
+          </a:r>
         </a:p>
       </dgm:t>
     </dgm:pt>
@@ -4064,7 +4086,10 @@
             <a:rPr lang="en-CA" sz="1000" dirty="0" err="1"/>
             <a:t>DataFrame</a:t>
           </a:r>
-          <a:endParaRPr lang="en-CA" sz="1000" dirty="0"/>
+          <a:r>
+            <a:rPr lang="en-CA" sz="1000" dirty="0"/>
+            <a:t>.</a:t>
+          </a:r>
         </a:p>
       </dgm:t>
     </dgm:pt>
@@ -4175,7 +4200,7 @@
           </a:pPr>
           <a:r>
             <a:rPr lang="en-CA" sz="1000" dirty="0"/>
-            <a:t>Tokenize data and change to lowercase</a:t>
+            <a:t>Tokenize data and change to lowercase.</a:t>
           </a:r>
         </a:p>
       </dgm:t>
@@ -4221,7 +4246,10 @@
             <a:rPr lang="en-CA" sz="1000" dirty="0" err="1"/>
             <a:t>stopwords</a:t>
           </a:r>
-          <a:endParaRPr lang="en-CA" sz="1000" dirty="0"/>
+          <a:r>
+            <a:rPr lang="en-CA" sz="1000" dirty="0"/>
+            <a:t>.</a:t>
+          </a:r>
         </a:p>
       </dgm:t>
     </dgm:pt>
@@ -4260,7 +4288,7 @@
           </a:pPr>
           <a:r>
             <a:rPr lang="en-CA" sz="1000" dirty="0"/>
-            <a:t>Stem and lemmatize remaining words</a:t>
+            <a:t>Stem and lemmatize remaining words.</a:t>
           </a:r>
         </a:p>
       </dgm:t>
@@ -4300,7 +4328,7 @@
           </a:pPr>
           <a:r>
             <a:rPr lang="en-CA" sz="1000" dirty="0"/>
-            <a:t>Add ‘length’ column</a:t>
+            <a:t>Add ‘length’ column.</a:t>
           </a:r>
         </a:p>
       </dgm:t>
@@ -4346,7 +4374,10 @@
             <a:rPr lang="en-CA" sz="900" dirty="0" err="1"/>
             <a:t>DataFrame</a:t>
           </a:r>
-          <a:endParaRPr lang="en-CA" sz="900" dirty="0"/>
+          <a:r>
+            <a:rPr lang="en-CA" sz="900" dirty="0"/>
+            <a:t>.</a:t>
+          </a:r>
         </a:p>
       </dgm:t>
     </dgm:pt>
@@ -4385,7 +4416,7 @@
           </a:pPr>
           <a:r>
             <a:rPr lang="en-CA" sz="900" dirty="0"/>
-            <a:t>Drop intermediate columns so ‘features’ and ‘labels’ are only ones</a:t>
+            <a:t>Drop intermediate columns so ‘features’ and ‘labels’ are only ones.</a:t>
           </a:r>
         </a:p>
       </dgm:t>
@@ -4425,7 +4456,7 @@
           </a:pPr>
           <a:r>
             <a:rPr lang="en-CA" sz="900" dirty="0"/>
-            <a:t>Change data type of ‘label’ (stars) to int</a:t>
+            <a:t>Change data type of ‘label’ (stars) to int.</a:t>
           </a:r>
         </a:p>
       </dgm:t>
@@ -4465,7 +4496,7 @@
           </a:pPr>
           <a:r>
             <a:rPr lang="en-CA" sz="900" dirty="0"/>
-            <a:t>Split data into training and testing sets</a:t>
+            <a:t>Split data into training and testing sets.</a:t>
           </a:r>
         </a:p>
       </dgm:t>
@@ -4505,7 +4536,7 @@
           </a:pPr>
           <a:r>
             <a:rPr lang="en-CA" sz="900" dirty="0"/>
-            <a:t> (Naïve Bayes / Logistic Regression): Create model and fit training data / (Neural Net): Specify layers, create and train model</a:t>
+            <a:t> (Naïve Bayes / Logistic Regression): Create model and fit training data / (Neural Net): Specify layers, create and train model.</a:t>
           </a:r>
         </a:p>
       </dgm:t>
@@ -4545,7 +4576,7 @@
           </a:pPr>
           <a:r>
             <a:rPr lang="en-CA" sz="900" dirty="0"/>
-            <a:t>Display accuracy of model prediction of rating</a:t>
+            <a:t>Display accuracy of model prediction of rating.</a:t>
           </a:r>
         </a:p>
       </dgm:t>
@@ -4599,7 +4630,10 @@
             <a:rPr lang="en-CA" sz="900" dirty="0" err="1"/>
             <a:t>DataFrame</a:t>
           </a:r>
-          <a:endParaRPr lang="en-CA" sz="900" dirty="0"/>
+          <a:r>
+            <a:rPr lang="en-CA" sz="900" dirty="0"/>
+            <a:t>.</a:t>
+          </a:r>
         </a:p>
       </dgm:t>
     </dgm:pt>
@@ -4626,211 +4660,6 @@
       </dgm:t>
     </dgm:pt>
     <dgm:pt modelId="{35E51F57-A897-49D2-99F8-47CBF27FF4B8}">
-      <dgm:prSet custT="1"/>
-      <dgm:spPr/>
-      <dgm:t>
-        <a:bodyPr anchor="b" anchorCtr="0"/>
-        <a:lstStyle/>
-        <a:p>
-          <a:pPr>
-            <a:buFont typeface="+mj-lt"/>
-            <a:buAutoNum type="arabicPeriod"/>
-          </a:pPr>
-          <a:r>
-            <a:rPr lang="en-CA" sz="900"/>
-            <a:t>Create star values list (array) column</a:t>
-          </a:r>
-          <a:endParaRPr lang="en-CA" sz="900" dirty="0"/>
-        </a:p>
-      </dgm:t>
-    </dgm:pt>
-    <dgm:pt modelId="{314B0363-D54F-4F52-8211-FB8A374974E1}" type="parTrans" cxnId="{2B979D74-0843-4AE3-93CF-C10ADABAADBF}">
-      <dgm:prSet/>
-      <dgm:spPr/>
-      <dgm:t>
-        <a:bodyPr/>
-        <a:lstStyle/>
-        <a:p>
-          <a:endParaRPr lang="en-CA"/>
-        </a:p>
-      </dgm:t>
-    </dgm:pt>
-    <dgm:pt modelId="{58665FF5-A4E0-4553-8AE7-FD40261D979F}" type="sibTrans" cxnId="{2B979D74-0843-4AE3-93CF-C10ADABAADBF}">
-      <dgm:prSet/>
-      <dgm:spPr/>
-      <dgm:t>
-        <a:bodyPr/>
-        <a:lstStyle/>
-        <a:p>
-          <a:endParaRPr lang="en-CA"/>
-        </a:p>
-      </dgm:t>
-    </dgm:pt>
-    <dgm:pt modelId="{24B36F21-8546-433A-B9D1-4725D002976B}">
-      <dgm:prSet custT="1"/>
-      <dgm:spPr/>
-      <dgm:t>
-        <a:bodyPr anchor="b" anchorCtr="0"/>
-        <a:lstStyle/>
-        <a:p>
-          <a:pPr>
-            <a:buFont typeface="+mj-lt"/>
-            <a:buAutoNum type="arabicPeriod"/>
-          </a:pPr>
-          <a:r>
-            <a:rPr lang="en-CA" sz="900"/>
-            <a:t>Initialize Count Vectorizer and create a vector model</a:t>
-          </a:r>
-          <a:endParaRPr lang="en-CA" sz="900" dirty="0"/>
-        </a:p>
-      </dgm:t>
-    </dgm:pt>
-    <dgm:pt modelId="{AD7FC10E-C001-4F45-AED8-E7FC39F6FFD4}" type="parTrans" cxnId="{45EB2C77-9431-4971-91C9-4CCD84E81CE0}">
-      <dgm:prSet/>
-      <dgm:spPr/>
-      <dgm:t>
-        <a:bodyPr/>
-        <a:lstStyle/>
-        <a:p>
-          <a:endParaRPr lang="en-CA"/>
-        </a:p>
-      </dgm:t>
-    </dgm:pt>
-    <dgm:pt modelId="{D6248BE3-ECDA-4716-B296-F18B23E52183}" type="sibTrans" cxnId="{45EB2C77-9431-4971-91C9-4CCD84E81CE0}">
-      <dgm:prSet/>
-      <dgm:spPr/>
-      <dgm:t>
-        <a:bodyPr/>
-        <a:lstStyle/>
-        <a:p>
-          <a:endParaRPr lang="en-CA"/>
-        </a:p>
-      </dgm:t>
-    </dgm:pt>
-    <dgm:pt modelId="{EDF3B1F8-3A2F-4B98-879D-D03AE77916AD}">
-      <dgm:prSet custT="1"/>
-      <dgm:spPr/>
-      <dgm:t>
-        <a:bodyPr anchor="b" anchorCtr="0"/>
-        <a:lstStyle/>
-        <a:p>
-          <a:pPr>
-            <a:buFont typeface="+mj-lt"/>
-            <a:buAutoNum type="arabicPeriod"/>
-          </a:pPr>
-          <a:r>
-            <a:rPr lang="en-CA" sz="900"/>
-            <a:t>One hot encode the vector model as column to the DataFrame</a:t>
-          </a:r>
-          <a:endParaRPr lang="en-CA" sz="900" dirty="0"/>
-        </a:p>
-      </dgm:t>
-    </dgm:pt>
-    <dgm:pt modelId="{D49F8028-EB80-4B9B-87FA-AA46D1F3E46F}" type="parTrans" cxnId="{3B10ADCE-67C3-4891-B5CC-FF4466AC6B11}">
-      <dgm:prSet/>
-      <dgm:spPr/>
-      <dgm:t>
-        <a:bodyPr/>
-        <a:lstStyle/>
-        <a:p>
-          <a:endParaRPr lang="en-CA"/>
-        </a:p>
-      </dgm:t>
-    </dgm:pt>
-    <dgm:pt modelId="{8E073775-42D3-4088-B498-2260D66D6B71}" type="sibTrans" cxnId="{3B10ADCE-67C3-4891-B5CC-FF4466AC6B11}">
-      <dgm:prSet/>
-      <dgm:spPr/>
-      <dgm:t>
-        <a:bodyPr/>
-        <a:lstStyle/>
-        <a:p>
-          <a:endParaRPr lang="en-CA"/>
-        </a:p>
-      </dgm:t>
-    </dgm:pt>
-    <dgm:pt modelId="{2F47178E-ED14-4A23-A568-4F9E22827203}">
-      <dgm:prSet custT="1"/>
-      <dgm:spPr/>
-      <dgm:t>
-        <a:bodyPr anchor="b" anchorCtr="0"/>
-        <a:lstStyle/>
-        <a:p>
-          <a:pPr>
-            <a:buFont typeface="+mj-lt"/>
-            <a:buAutoNum type="arabicPeriod"/>
-          </a:pPr>
-          <a:r>
-            <a:rPr lang="en-CA" sz="900"/>
-            <a:t>Create all features and feature vector</a:t>
-          </a:r>
-          <a:endParaRPr lang="en-CA" sz="900" dirty="0"/>
-        </a:p>
-      </dgm:t>
-    </dgm:pt>
-    <dgm:pt modelId="{81F41C83-A367-4716-BE4B-665C720720AF}" type="parTrans" cxnId="{4386946F-5F27-4E9C-8AAA-E9E8A9CD0B92}">
-      <dgm:prSet/>
-      <dgm:spPr/>
-      <dgm:t>
-        <a:bodyPr/>
-        <a:lstStyle/>
-        <a:p>
-          <a:endParaRPr lang="en-CA"/>
-        </a:p>
-      </dgm:t>
-    </dgm:pt>
-    <dgm:pt modelId="{64F8455E-34C5-43C6-AE49-15270811B1B7}" type="sibTrans" cxnId="{4386946F-5F27-4E9C-8AAA-E9E8A9CD0B92}">
-      <dgm:prSet/>
-      <dgm:spPr/>
-      <dgm:t>
-        <a:bodyPr/>
-        <a:lstStyle/>
-        <a:p>
-          <a:endParaRPr lang="en-CA"/>
-        </a:p>
-      </dgm:t>
-    </dgm:pt>
-    <dgm:pt modelId="{81083DD8-68E7-4116-9E6E-1FD5A8D52432}">
-      <dgm:prSet custT="1"/>
-      <dgm:spPr/>
-      <dgm:t>
-        <a:bodyPr anchor="b" anchorCtr="0"/>
-        <a:lstStyle/>
-        <a:p>
-          <a:pPr>
-            <a:buFont typeface="+mj-lt"/>
-            <a:buAutoNum type="arabicPeriod"/>
-          </a:pPr>
-          <a:r>
-            <a:rPr lang="en-CA" sz="900"/>
-            <a:t>Create and run data processing pipeline</a:t>
-          </a:r>
-          <a:endParaRPr lang="en-CA" sz="900" dirty="0"/>
-        </a:p>
-      </dgm:t>
-    </dgm:pt>
-    <dgm:pt modelId="{0CC15854-5C6D-4D83-B100-D5F339182890}" type="parTrans" cxnId="{22B3172E-2854-4C98-9FC0-39ADF5204DE6}">
-      <dgm:prSet/>
-      <dgm:spPr/>
-      <dgm:t>
-        <a:bodyPr/>
-        <a:lstStyle/>
-        <a:p>
-          <a:endParaRPr lang="en-CA"/>
-        </a:p>
-      </dgm:t>
-    </dgm:pt>
-    <dgm:pt modelId="{5D5AFF4F-62DD-46BA-83AC-44A1ECE20CAE}" type="sibTrans" cxnId="{22B3172E-2854-4C98-9FC0-39ADF5204DE6}">
-      <dgm:prSet/>
-      <dgm:spPr/>
-      <dgm:t>
-        <a:bodyPr/>
-        <a:lstStyle/>
-        <a:p>
-          <a:endParaRPr lang="en-CA"/>
-        </a:p>
-      </dgm:t>
-    </dgm:pt>
-    <dgm:pt modelId="{732D2F61-02B8-43E9-B308-CF68C56839E7}">
       <dgm:prSet custT="1"/>
       <dgm:spPr/>
       <dgm:t>
@@ -4843,7 +4672,215 @@
           </a:pPr>
           <a:r>
             <a:rPr lang="en-CA" sz="900" dirty="0"/>
-            <a:t>Fit and transform pipeline</a:t>
+            <a:t>Create star values list (array) column.</a:t>
+          </a:r>
+        </a:p>
+      </dgm:t>
+    </dgm:pt>
+    <dgm:pt modelId="{314B0363-D54F-4F52-8211-FB8A374974E1}" type="parTrans" cxnId="{2B979D74-0843-4AE3-93CF-C10ADABAADBF}">
+      <dgm:prSet/>
+      <dgm:spPr/>
+      <dgm:t>
+        <a:bodyPr/>
+        <a:lstStyle/>
+        <a:p>
+          <a:endParaRPr lang="en-CA"/>
+        </a:p>
+      </dgm:t>
+    </dgm:pt>
+    <dgm:pt modelId="{58665FF5-A4E0-4553-8AE7-FD40261D979F}" type="sibTrans" cxnId="{2B979D74-0843-4AE3-93CF-C10ADABAADBF}">
+      <dgm:prSet/>
+      <dgm:spPr/>
+      <dgm:t>
+        <a:bodyPr/>
+        <a:lstStyle/>
+        <a:p>
+          <a:endParaRPr lang="en-CA"/>
+        </a:p>
+      </dgm:t>
+    </dgm:pt>
+    <dgm:pt modelId="{24B36F21-8546-433A-B9D1-4725D002976B}">
+      <dgm:prSet custT="1"/>
+      <dgm:spPr/>
+      <dgm:t>
+        <a:bodyPr anchor="b" anchorCtr="0"/>
+        <a:lstStyle/>
+        <a:p>
+          <a:pPr>
+            <a:buFont typeface="+mj-lt"/>
+            <a:buAutoNum type="arabicPeriod"/>
+          </a:pPr>
+          <a:r>
+            <a:rPr lang="en-CA" sz="900" dirty="0"/>
+            <a:t>Initialize Count Vectorizer and create a vector model</a:t>
+          </a:r>
+        </a:p>
+      </dgm:t>
+    </dgm:pt>
+    <dgm:pt modelId="{AD7FC10E-C001-4F45-AED8-E7FC39F6FFD4}" type="parTrans" cxnId="{45EB2C77-9431-4971-91C9-4CCD84E81CE0}">
+      <dgm:prSet/>
+      <dgm:spPr/>
+      <dgm:t>
+        <a:bodyPr/>
+        <a:lstStyle/>
+        <a:p>
+          <a:endParaRPr lang="en-CA"/>
+        </a:p>
+      </dgm:t>
+    </dgm:pt>
+    <dgm:pt modelId="{D6248BE3-ECDA-4716-B296-F18B23E52183}" type="sibTrans" cxnId="{45EB2C77-9431-4971-91C9-4CCD84E81CE0}">
+      <dgm:prSet/>
+      <dgm:spPr/>
+      <dgm:t>
+        <a:bodyPr/>
+        <a:lstStyle/>
+        <a:p>
+          <a:endParaRPr lang="en-CA"/>
+        </a:p>
+      </dgm:t>
+    </dgm:pt>
+    <dgm:pt modelId="{EDF3B1F8-3A2F-4B98-879D-D03AE77916AD}">
+      <dgm:prSet custT="1"/>
+      <dgm:spPr/>
+      <dgm:t>
+        <a:bodyPr anchor="b" anchorCtr="0"/>
+        <a:lstStyle/>
+        <a:p>
+          <a:pPr>
+            <a:buFont typeface="+mj-lt"/>
+            <a:buAutoNum type="arabicPeriod"/>
+          </a:pPr>
+          <a:r>
+            <a:rPr lang="en-CA" sz="900" dirty="0"/>
+            <a:t>One hot encode the vector model as column to the </a:t>
+          </a:r>
+          <a:r>
+            <a:rPr lang="en-CA" sz="900" dirty="0" err="1"/>
+            <a:t>DataFrame</a:t>
+          </a:r>
+          <a:r>
+            <a:rPr lang="en-CA" sz="900" dirty="0"/>
+            <a:t>.</a:t>
+          </a:r>
+        </a:p>
+      </dgm:t>
+    </dgm:pt>
+    <dgm:pt modelId="{D49F8028-EB80-4B9B-87FA-AA46D1F3E46F}" type="parTrans" cxnId="{3B10ADCE-67C3-4891-B5CC-FF4466AC6B11}">
+      <dgm:prSet/>
+      <dgm:spPr/>
+      <dgm:t>
+        <a:bodyPr/>
+        <a:lstStyle/>
+        <a:p>
+          <a:endParaRPr lang="en-CA"/>
+        </a:p>
+      </dgm:t>
+    </dgm:pt>
+    <dgm:pt modelId="{8E073775-42D3-4088-B498-2260D66D6B71}" type="sibTrans" cxnId="{3B10ADCE-67C3-4891-B5CC-FF4466AC6B11}">
+      <dgm:prSet/>
+      <dgm:spPr/>
+      <dgm:t>
+        <a:bodyPr/>
+        <a:lstStyle/>
+        <a:p>
+          <a:endParaRPr lang="en-CA"/>
+        </a:p>
+      </dgm:t>
+    </dgm:pt>
+    <dgm:pt modelId="{2F47178E-ED14-4A23-A568-4F9E22827203}">
+      <dgm:prSet custT="1"/>
+      <dgm:spPr/>
+      <dgm:t>
+        <a:bodyPr anchor="b" anchorCtr="0"/>
+        <a:lstStyle/>
+        <a:p>
+          <a:pPr>
+            <a:buFont typeface="+mj-lt"/>
+            <a:buAutoNum type="arabicPeriod"/>
+          </a:pPr>
+          <a:r>
+            <a:rPr lang="en-CA" sz="900" dirty="0"/>
+            <a:t>Create all features and feature vector.</a:t>
+          </a:r>
+        </a:p>
+      </dgm:t>
+    </dgm:pt>
+    <dgm:pt modelId="{81F41C83-A367-4716-BE4B-665C720720AF}" type="parTrans" cxnId="{4386946F-5F27-4E9C-8AAA-E9E8A9CD0B92}">
+      <dgm:prSet/>
+      <dgm:spPr/>
+      <dgm:t>
+        <a:bodyPr/>
+        <a:lstStyle/>
+        <a:p>
+          <a:endParaRPr lang="en-CA"/>
+        </a:p>
+      </dgm:t>
+    </dgm:pt>
+    <dgm:pt modelId="{64F8455E-34C5-43C6-AE49-15270811B1B7}" type="sibTrans" cxnId="{4386946F-5F27-4E9C-8AAA-E9E8A9CD0B92}">
+      <dgm:prSet/>
+      <dgm:spPr/>
+      <dgm:t>
+        <a:bodyPr/>
+        <a:lstStyle/>
+        <a:p>
+          <a:endParaRPr lang="en-CA"/>
+        </a:p>
+      </dgm:t>
+    </dgm:pt>
+    <dgm:pt modelId="{81083DD8-68E7-4116-9E6E-1FD5A8D52432}">
+      <dgm:prSet custT="1"/>
+      <dgm:spPr/>
+      <dgm:t>
+        <a:bodyPr anchor="b" anchorCtr="0"/>
+        <a:lstStyle/>
+        <a:p>
+          <a:pPr>
+            <a:buFont typeface="+mj-lt"/>
+            <a:buAutoNum type="arabicPeriod"/>
+          </a:pPr>
+          <a:r>
+            <a:rPr lang="en-CA" sz="900" dirty="0"/>
+            <a:t>Create and run data processing pipeline.</a:t>
+          </a:r>
+        </a:p>
+      </dgm:t>
+    </dgm:pt>
+    <dgm:pt modelId="{0CC15854-5C6D-4D83-B100-D5F339182890}" type="parTrans" cxnId="{22B3172E-2854-4C98-9FC0-39ADF5204DE6}">
+      <dgm:prSet/>
+      <dgm:spPr/>
+      <dgm:t>
+        <a:bodyPr/>
+        <a:lstStyle/>
+        <a:p>
+          <a:endParaRPr lang="en-CA"/>
+        </a:p>
+      </dgm:t>
+    </dgm:pt>
+    <dgm:pt modelId="{5D5AFF4F-62DD-46BA-83AC-44A1ECE20CAE}" type="sibTrans" cxnId="{22B3172E-2854-4C98-9FC0-39ADF5204DE6}">
+      <dgm:prSet/>
+      <dgm:spPr/>
+      <dgm:t>
+        <a:bodyPr/>
+        <a:lstStyle/>
+        <a:p>
+          <a:endParaRPr lang="en-CA"/>
+        </a:p>
+      </dgm:t>
+    </dgm:pt>
+    <dgm:pt modelId="{732D2F61-02B8-43E9-B308-CF68C56839E7}">
+      <dgm:prSet custT="1"/>
+      <dgm:spPr/>
+      <dgm:t>
+        <a:bodyPr anchor="b" anchorCtr="0"/>
+        <a:lstStyle/>
+        <a:p>
+          <a:pPr>
+            <a:buFont typeface="+mj-lt"/>
+            <a:buAutoNum type="arabicPeriod"/>
+          </a:pPr>
+          <a:r>
+            <a:rPr lang="en-CA" sz="900" dirty="0"/>
+            <a:t>Fit and transform pipeline.</a:t>
           </a:r>
         </a:p>
       </dgm:t>
@@ -4901,7 +4938,7 @@
       <dgm:spPr/>
     </dgm:pt>
     <dgm:pt modelId="{24C95D2B-48EA-4A7B-8F0B-F1AC241A9DCF}" type="pres">
-      <dgm:prSet presAssocID="{3901DFD9-C5D7-442E-AEE2-90766AF8E80E}" presName="childNode1" presStyleLbl="bgAcc1" presStyleIdx="0" presStyleCnt="5" custScaleX="114460" custScaleY="106277" custLinFactNeighborX="18519" custLinFactNeighborY="-17260">
+      <dgm:prSet presAssocID="{3901DFD9-C5D7-442E-AEE2-90766AF8E80E}" presName="childNode1" presStyleLbl="bgAcc1" presStyleIdx="0" presStyleCnt="5" custScaleX="114460" custScaleY="106277" custLinFactNeighborX="17796" custLinFactNeighborY="-17260">
         <dgm:presLayoutVars>
           <dgm:bulletEnabled val="1"/>
         </dgm:presLayoutVars>
@@ -4983,7 +5020,7 @@
       <dgm:spPr/>
     </dgm:pt>
     <dgm:pt modelId="{D4643005-3B07-4333-B39F-EFEAC7771BAA}" type="pres">
-      <dgm:prSet presAssocID="{C9BA18C6-1688-44A3-B585-0F30B69F9C4F}" presName="childNode1" presStyleLbl="bgAcc1" presStyleIdx="2" presStyleCnt="5" custScaleX="136075" custScaleY="106277" custLinFactNeighborX="-7161" custLinFactNeighborY="-16882">
+      <dgm:prSet presAssocID="{C9BA18C6-1688-44A3-B585-0F30B69F9C4F}" presName="childNode1" presStyleLbl="bgAcc1" presStyleIdx="2" presStyleCnt="5" custScaleX="138751" custScaleY="106277" custLinFactNeighborX="-7161" custLinFactNeighborY="-16882">
         <dgm:presLayoutVars>
           <dgm:bulletEnabled val="1"/>
         </dgm:presLayoutVars>
@@ -6876,8 +6913,8 @@
       </dsp:nvSpPr>
       <dsp:spPr>
         <a:xfrm>
-          <a:off x="325361" y="2567330"/>
-          <a:ext cx="1983748" cy="1519203"/>
+          <a:off x="310447" y="2570940"/>
+          <a:ext cx="1976629" cy="1513751"/>
         </a:xfrm>
         <a:prstGeom prst="roundRect">
           <a:avLst>
@@ -6945,25 +6982,9 @@
             <a:rPr lang="en-CA" sz="900" kern="1200" dirty="0" err="1"/>
             <a:t>Findspark</a:t>
           </a:r>
-          <a:endParaRPr lang="en-CA" sz="900" kern="1200" dirty="0"/>
-        </a:p>
-        <a:p>
-          <a:pPr marL="57150" lvl="1" indent="-57150" algn="l" defTabSz="400050">
-            <a:lnSpc>
-              <a:spcPct val="90000"/>
-            </a:lnSpc>
-            <a:spcBef>
-              <a:spcPct val="0"/>
-            </a:spcBef>
-            <a:spcAft>
-              <a:spcPct val="15000"/>
-            </a:spcAft>
-            <a:buFont typeface="+mj-lt"/>
-            <a:buAutoNum type="arabicPeriod"/>
-          </a:pPr>
           <a:r>
             <a:rPr lang="en-CA" sz="900" kern="1200" dirty="0"/>
-            <a:t>Set Environment Variables</a:t>
+            <a:t>.</a:t>
           </a:r>
         </a:p>
         <a:p>
@@ -6982,7 +7003,7 @@
           </a:pPr>
           <a:r>
             <a:rPr lang="en-CA" sz="900" kern="1200" dirty="0"/>
-            <a:t>Start a SparkSession</a:t>
+            <a:t>Set environment variables.</a:t>
           </a:r>
         </a:p>
         <a:p>
@@ -7001,7 +7022,15 @@
           </a:pPr>
           <a:r>
             <a:rPr lang="en-CA" sz="900" kern="1200" dirty="0"/>
-            <a:t>Interact with SQL</a:t>
+            <a:t>Start a </a:t>
+          </a:r>
+          <a:r>
+            <a:rPr lang="en-CA" sz="900" kern="1200" dirty="0" err="1"/>
+            <a:t>SparkSession</a:t>
+          </a:r>
+          <a:r>
+            <a:rPr lang="en-CA" sz="900" kern="1200" dirty="0"/>
+            <a:t>.</a:t>
           </a:r>
         </a:p>
         <a:p>
@@ -7020,7 +7049,26 @@
           </a:pPr>
           <a:r>
             <a:rPr lang="en-CA" sz="900" kern="1200" dirty="0"/>
-            <a:t>Create Spark application</a:t>
+            <a:t>Interact with SQL.</a:t>
+          </a:r>
+        </a:p>
+        <a:p>
+          <a:pPr marL="57150" lvl="1" indent="-57150" algn="l" defTabSz="400050">
+            <a:lnSpc>
+              <a:spcPct val="90000"/>
+            </a:lnSpc>
+            <a:spcBef>
+              <a:spcPct val="0"/>
+            </a:spcBef>
+            <a:spcAft>
+              <a:spcPct val="15000"/>
+            </a:spcAft>
+            <a:buFont typeface="+mj-lt"/>
+            <a:buAutoNum type="arabicPeriod"/>
+          </a:pPr>
+          <a:r>
+            <a:rPr lang="en-CA" sz="900" kern="1200" dirty="0"/>
+            <a:t>Create Spark application.</a:t>
           </a:r>
         </a:p>
         <a:p>
@@ -7039,7 +7087,15 @@
           </a:pPr>
           <a:r>
             <a:rPr lang="en-US" sz="900" kern="1200" dirty="0"/>
-            <a:t>gcloud login and check the DB</a:t>
+            <a:t>Login to </a:t>
+          </a:r>
+          <a:r>
+            <a:rPr lang="en-US" sz="900" kern="1200" dirty="0" err="1"/>
+            <a:t>gcloud</a:t>
+          </a:r>
+          <a:r>
+            <a:rPr lang="en-US" sz="900" kern="1200" dirty="0"/>
+            <a:t> and check the DB.</a:t>
           </a:r>
           <a:endParaRPr lang="en-CA" sz="900" kern="1200" dirty="0"/>
         </a:p>
@@ -7059,7 +7115,7 @@
           </a:pPr>
           <a:r>
             <a:rPr lang="en-US" sz="900" kern="1200" dirty="0"/>
-            <a:t>download and initialize the SQL proxy</a:t>
+            <a:t>Download and initialize the SQL proxy.</a:t>
           </a:r>
           <a:endParaRPr lang="en-CA" sz="900" kern="1200" dirty="0"/>
         </a:p>
@@ -7079,13 +7135,13 @@
           </a:pPr>
           <a:r>
             <a:rPr lang="en-CA" sz="900" kern="1200" dirty="0"/>
-            <a:t>Configure settings for RDS</a:t>
+            <a:t>Configure settings for RDS.</a:t>
           </a:r>
         </a:p>
       </dsp:txBody>
       <dsp:txXfrm>
-        <a:off x="360322" y="2602291"/>
-        <a:ext cx="1913826" cy="1123737"/>
+        <a:off x="345283" y="2605776"/>
+        <a:ext cx="1906957" cy="1119704"/>
       </dsp:txXfrm>
     </dsp:sp>
     <dsp:sp modelId="{FFEAD238-735F-47A7-B527-83E9090472C1}">
@@ -7095,8 +7151,8 @@
       </dsp:nvSpPr>
       <dsp:spPr>
         <a:xfrm>
-          <a:off x="1413887" y="3324129"/>
-          <a:ext cx="1550740" cy="1550740"/>
+          <a:off x="1407553" y="3325023"/>
+          <a:ext cx="1545175" cy="1545175"/>
         </a:xfrm>
         <a:prstGeom prst="leftCircularArrow">
           <a:avLst>
@@ -7143,8 +7199,8 @@
       </dsp:nvSpPr>
       <dsp:spPr>
         <a:xfrm>
-          <a:off x="871721" y="3952956"/>
-          <a:ext cx="1540565" cy="612632"/>
+          <a:off x="867332" y="3951594"/>
+          <a:ext cx="1535037" cy="610433"/>
         </a:xfrm>
         <a:prstGeom prst="roundRect">
           <a:avLst>
@@ -7212,8 +7268,8 @@
         </a:p>
       </dsp:txBody>
       <dsp:txXfrm>
-        <a:off x="889664" y="3970899"/>
-        <a:ext cx="1504679" cy="576746"/>
+        <a:off x="885211" y="3969473"/>
+        <a:ext cx="1499279" cy="574675"/>
       </dsp:txXfrm>
     </dsp:sp>
     <dsp:sp modelId="{6A0EB708-BF17-40BD-A091-293B8939B770}">
@@ -7223,8 +7279,8 @@
       </dsp:nvSpPr>
       <dsp:spPr>
         <a:xfrm>
-          <a:off x="2467436" y="2549421"/>
-          <a:ext cx="1555940" cy="1519203"/>
+          <a:off x="2457321" y="2553095"/>
+          <a:ext cx="1550357" cy="1513751"/>
         </a:xfrm>
         <a:prstGeom prst="roundRect">
           <a:avLst>
@@ -7286,7 +7342,7 @@
           </a:pPr>
           <a:r>
             <a:rPr lang="en-CA" sz="1000" i="0" kern="1200" dirty="0"/>
-            <a:t>Read data from DB</a:t>
+            <a:t>Read data from DB.</a:t>
           </a:r>
         </a:p>
         <a:p>
@@ -7305,7 +7361,7 @@
           </a:pPr>
           <a:r>
             <a:rPr lang="en-CA" sz="1000" kern="1200" dirty="0"/>
-            <a:t>Pull tables from DB</a:t>
+            <a:t>Pull tables from DB.</a:t>
           </a:r>
         </a:p>
         <a:p>
@@ -7338,7 +7394,10 @@
             <a:rPr lang="en-CA" sz="1000" kern="1200" dirty="0" err="1"/>
             <a:t>DataFrame</a:t>
           </a:r>
-          <a:endParaRPr lang="en-CA" sz="1000" kern="1200" dirty="0"/>
+          <a:r>
+            <a:rPr lang="en-CA" sz="1000" kern="1200" dirty="0"/>
+            <a:t>.</a:t>
+          </a:r>
         </a:p>
         <a:p>
           <a:pPr marL="57150" lvl="1" indent="-57150" algn="l" defTabSz="444500">
@@ -7362,12 +7421,15 @@
             <a:rPr lang="en-CA" sz="1000" kern="1200" dirty="0" err="1"/>
             <a:t>DataFrame</a:t>
           </a:r>
-          <a:endParaRPr lang="en-CA" sz="1000" kern="1200" dirty="0"/>
+          <a:r>
+            <a:rPr lang="en-CA" sz="1000" kern="1200" dirty="0"/>
+            <a:t>.</a:t>
+          </a:r>
         </a:p>
       </dsp:txBody>
       <dsp:txXfrm>
-        <a:off x="2502397" y="2909925"/>
-        <a:ext cx="1486018" cy="1123737"/>
+        <a:off x="2492157" y="2912307"/>
+        <a:ext cx="1480685" cy="1119704"/>
       </dsp:txXfrm>
     </dsp:sp>
     <dsp:sp modelId="{29D44E95-17B6-4F1F-8ADE-3CE0117F29BA}">
@@ -7377,16 +7439,16 @@
       </dsp:nvSpPr>
       <dsp:spPr>
         <a:xfrm>
-          <a:off x="3248366" y="1587967"/>
-          <a:ext cx="2234547" cy="2234547"/>
+          <a:off x="3233836" y="1588486"/>
+          <a:ext cx="2252861" cy="2252861"/>
         </a:xfrm>
         <a:prstGeom prst="circularArrow">
           <a:avLst>
-            <a:gd name="adj1" fmla="val 2335"/>
-            <a:gd name="adj2" fmla="val 281956"/>
-            <a:gd name="adj3" fmla="val 20007686"/>
-            <a:gd name="adj4" fmla="val 13040663"/>
-            <a:gd name="adj5" fmla="val 2725"/>
+            <a:gd name="adj1" fmla="val 2308"/>
+            <a:gd name="adj2" fmla="val 278485"/>
+            <a:gd name="adj3" fmla="val 20005399"/>
+            <a:gd name="adj4" fmla="val 13034905"/>
+            <a:gd name="adj5" fmla="val 2693"/>
           </a:avLst>
         </a:prstGeom>
         <a:solidFill>
@@ -7425,8 +7487,8 @@
       </dsp:nvSpPr>
       <dsp:spPr>
         <a:xfrm>
-          <a:off x="2752065" y="2061791"/>
-          <a:ext cx="1540565" cy="612632"/>
+          <a:off x="2740928" y="2067215"/>
+          <a:ext cx="1535037" cy="610433"/>
         </a:xfrm>
         <a:prstGeom prst="roundRect">
           <a:avLst>
@@ -7494,8 +7556,8 @@
         </a:p>
       </dsp:txBody>
       <dsp:txXfrm>
-        <a:off x="2770008" y="2079734"/>
-        <a:ext cx="1504679" cy="576746"/>
+        <a:off x="2758807" y="2085094"/>
+        <a:ext cx="1499279" cy="574675"/>
       </dsp:txXfrm>
     </dsp:sp>
     <dsp:sp modelId="{D4643005-3B07-4333-B39F-EFEAC7771BAA}">
@@ -7505,8 +7567,8 @@
       </dsp:nvSpPr>
       <dsp:spPr>
         <a:xfrm>
-          <a:off x="4354011" y="2572733"/>
-          <a:ext cx="2358365" cy="1519203"/>
+          <a:off x="4337126" y="2576324"/>
+          <a:ext cx="2396114" cy="1513751"/>
         </a:xfrm>
         <a:prstGeom prst="roundRect">
           <a:avLst>
@@ -7568,7 +7630,7 @@
           </a:pPr>
           <a:r>
             <a:rPr lang="en-CA" sz="1000" kern="1200" dirty="0"/>
-            <a:t>Categorize into binary categories (binary) / Drop rows with 2 and 4 stars (3-category) / Keep all rows (5-category)</a:t>
+            <a:t>Categorize into binary categories (binary) / Drop rows with 2 and 4 stars (3-category) / Keep all rows (5-category).</a:t>
           </a:r>
         </a:p>
         <a:p>
@@ -7587,7 +7649,7 @@
           </a:pPr>
           <a:r>
             <a:rPr lang="en-CA" sz="1000" kern="1200" dirty="0"/>
-            <a:t>Remove punctuation</a:t>
+            <a:t>Remove punctuation.</a:t>
           </a:r>
         </a:p>
         <a:p>
@@ -7606,7 +7668,7 @@
           </a:pPr>
           <a:r>
             <a:rPr lang="en-CA" sz="1000" kern="1200" dirty="0"/>
-            <a:t>Tokenize data and change to lowercase</a:t>
+            <a:t>Tokenize data and change to lowercase.</a:t>
           </a:r>
         </a:p>
         <a:p>
@@ -7631,25 +7693,9 @@
             <a:rPr lang="en-CA" sz="1000" kern="1200" dirty="0" err="1"/>
             <a:t>stopwords</a:t>
           </a:r>
-          <a:endParaRPr lang="en-CA" sz="1000" kern="1200" dirty="0"/>
-        </a:p>
-        <a:p>
-          <a:pPr marL="57150" lvl="1" indent="-57150" algn="l" defTabSz="444500">
-            <a:lnSpc>
-              <a:spcPct val="90000"/>
-            </a:lnSpc>
-            <a:spcBef>
-              <a:spcPct val="0"/>
-            </a:spcBef>
-            <a:spcAft>
-              <a:spcPct val="15000"/>
-            </a:spcAft>
-            <a:buFont typeface="+mj-lt"/>
-            <a:buAutoNum type="arabicPeriod"/>
-          </a:pPr>
           <a:r>
             <a:rPr lang="en-CA" sz="1000" kern="1200" dirty="0"/>
-            <a:t>Stem and lemmatize remaining words</a:t>
+            <a:t>.</a:t>
           </a:r>
         </a:p>
         <a:p>
@@ -7668,13 +7714,32 @@
           </a:pPr>
           <a:r>
             <a:rPr lang="en-CA" sz="1000" kern="1200" dirty="0"/>
-            <a:t>Add ‘length’ column</a:t>
+            <a:t>Stem and lemmatize remaining words.</a:t>
+          </a:r>
+        </a:p>
+        <a:p>
+          <a:pPr marL="57150" lvl="1" indent="-57150" algn="l" defTabSz="444500">
+            <a:lnSpc>
+              <a:spcPct val="90000"/>
+            </a:lnSpc>
+            <a:spcBef>
+              <a:spcPct val="0"/>
+            </a:spcBef>
+            <a:spcAft>
+              <a:spcPct val="15000"/>
+            </a:spcAft>
+            <a:buFont typeface="+mj-lt"/>
+            <a:buAutoNum type="arabicPeriod"/>
+          </a:pPr>
+          <a:r>
+            <a:rPr lang="en-CA" sz="1000" kern="1200" dirty="0"/>
+            <a:t>Add ‘length’ column.</a:t>
           </a:r>
         </a:p>
       </dsp:txBody>
       <dsp:txXfrm>
-        <a:off x="4388972" y="2607694"/>
-        <a:ext cx="2288443" cy="1123737"/>
+        <a:off x="4371962" y="2611160"/>
+        <a:ext cx="2326442" cy="1119704"/>
       </dsp:txXfrm>
     </dsp:sp>
     <dsp:sp modelId="{7653ECB6-67B7-4855-9BD2-4E4CE71939F8}">
@@ -7684,16 +7749,16 @@
       </dsp:nvSpPr>
       <dsp:spPr>
         <a:xfrm>
-          <a:off x="5727296" y="2699863"/>
-          <a:ext cx="2058390" cy="2403482"/>
+          <a:off x="5728329" y="2683210"/>
+          <a:ext cx="2073659" cy="2421311"/>
         </a:xfrm>
         <a:prstGeom prst="leftCircularArrow">
           <a:avLst>
-            <a:gd name="adj1" fmla="val 2171"/>
-            <a:gd name="adj2" fmla="val 261149"/>
-            <a:gd name="adj3" fmla="val 1709405"/>
-            <a:gd name="adj4" fmla="val 8697235"/>
-            <a:gd name="adj5" fmla="val 2533"/>
+            <a:gd name="adj1" fmla="val 2148"/>
+            <a:gd name="adj2" fmla="val 258155"/>
+            <a:gd name="adj3" fmla="val 1710172"/>
+            <a:gd name="adj4" fmla="val 8700995"/>
+            <a:gd name="adj5" fmla="val 2505"/>
           </a:avLst>
         </a:prstGeom>
         <a:solidFill>
@@ -7732,8 +7797,8 @@
       </dsp:nvSpPr>
       <dsp:spPr>
         <a:xfrm>
-          <a:off x="5092717" y="3946591"/>
-          <a:ext cx="1540565" cy="612632"/>
+          <a:off x="5096288" y="3945251"/>
+          <a:ext cx="1535037" cy="610433"/>
         </a:xfrm>
         <a:prstGeom prst="roundRect">
           <a:avLst>
@@ -7800,8 +7865,8 @@
         </a:p>
       </dsp:txBody>
       <dsp:txXfrm>
-        <a:off x="5110660" y="3964534"/>
-        <a:ext cx="1504679" cy="576746"/>
+        <a:off x="5114167" y="3963130"/>
+        <a:ext cx="1499279" cy="574675"/>
       </dsp:txXfrm>
     </dsp:sp>
     <dsp:sp modelId="{F3B7B9E5-0788-4163-BD1D-3DEDCE2D6B32}">
@@ -7811,8 +7876,8 @@
       </dsp:nvSpPr>
       <dsp:spPr>
         <a:xfrm>
-          <a:off x="6949351" y="2588617"/>
-          <a:ext cx="2543620" cy="1519203"/>
+          <a:off x="6969365" y="2592151"/>
+          <a:ext cx="2534492" cy="1513751"/>
         </a:xfrm>
         <a:prstGeom prst="roundRect">
           <a:avLst>
@@ -7880,7 +7945,10 @@
             <a:rPr lang="en-CA" sz="900" kern="1200" dirty="0" err="1"/>
             <a:t>DataFrame</a:t>
           </a:r>
-          <a:endParaRPr lang="en-CA" sz="900" kern="1200" dirty="0"/>
+          <a:r>
+            <a:rPr lang="en-CA" sz="900" kern="1200" dirty="0"/>
+            <a:t>.</a:t>
+          </a:r>
         </a:p>
         <a:p>
           <a:pPr marL="57150" lvl="1" indent="-57150" algn="l" defTabSz="400050">
@@ -7912,107 +7980,10 @@
             <a:rPr lang="en-CA" sz="900" kern="1200" dirty="0" err="1"/>
             <a:t>DataFrame</a:t>
           </a:r>
-          <a:endParaRPr lang="en-CA" sz="900" kern="1200" dirty="0"/>
-        </a:p>
-        <a:p>
-          <a:pPr marL="57150" lvl="1" indent="-57150" algn="l" defTabSz="400050">
-            <a:lnSpc>
-              <a:spcPct val="90000"/>
-            </a:lnSpc>
-            <a:spcBef>
-              <a:spcPct val="0"/>
-            </a:spcBef>
-            <a:spcAft>
-              <a:spcPct val="15000"/>
-            </a:spcAft>
-            <a:buFont typeface="+mj-lt"/>
-            <a:buAutoNum type="arabicPeriod"/>
-          </a:pPr>
           <a:r>
-            <a:rPr lang="en-CA" sz="900" kern="1200"/>
-            <a:t>Create star values list (array) column</a:t>
+            <a:rPr lang="en-CA" sz="900" kern="1200" dirty="0"/>
+            <a:t>.</a:t>
           </a:r>
-          <a:endParaRPr lang="en-CA" sz="900" kern="1200" dirty="0"/>
-        </a:p>
-        <a:p>
-          <a:pPr marL="57150" lvl="1" indent="-57150" algn="l" defTabSz="400050">
-            <a:lnSpc>
-              <a:spcPct val="90000"/>
-            </a:lnSpc>
-            <a:spcBef>
-              <a:spcPct val="0"/>
-            </a:spcBef>
-            <a:spcAft>
-              <a:spcPct val="15000"/>
-            </a:spcAft>
-            <a:buFont typeface="+mj-lt"/>
-            <a:buAutoNum type="arabicPeriod"/>
-          </a:pPr>
-          <a:r>
-            <a:rPr lang="en-CA" sz="900" kern="1200"/>
-            <a:t>Initialize Count Vectorizer and create a vector model</a:t>
-          </a:r>
-          <a:endParaRPr lang="en-CA" sz="900" kern="1200" dirty="0"/>
-        </a:p>
-        <a:p>
-          <a:pPr marL="57150" lvl="1" indent="-57150" algn="l" defTabSz="400050">
-            <a:lnSpc>
-              <a:spcPct val="90000"/>
-            </a:lnSpc>
-            <a:spcBef>
-              <a:spcPct val="0"/>
-            </a:spcBef>
-            <a:spcAft>
-              <a:spcPct val="15000"/>
-            </a:spcAft>
-            <a:buFont typeface="+mj-lt"/>
-            <a:buAutoNum type="arabicPeriod"/>
-          </a:pPr>
-          <a:r>
-            <a:rPr lang="en-CA" sz="900" kern="1200"/>
-            <a:t>One hot encode the vector model as column to the DataFrame</a:t>
-          </a:r>
-          <a:endParaRPr lang="en-CA" sz="900" kern="1200" dirty="0"/>
-        </a:p>
-        <a:p>
-          <a:pPr marL="57150" lvl="1" indent="-57150" algn="l" defTabSz="400050">
-            <a:lnSpc>
-              <a:spcPct val="90000"/>
-            </a:lnSpc>
-            <a:spcBef>
-              <a:spcPct val="0"/>
-            </a:spcBef>
-            <a:spcAft>
-              <a:spcPct val="15000"/>
-            </a:spcAft>
-            <a:buFont typeface="+mj-lt"/>
-            <a:buAutoNum type="arabicPeriod"/>
-          </a:pPr>
-          <a:r>
-            <a:rPr lang="en-CA" sz="900" kern="1200"/>
-            <a:t>Create all features and feature vector</a:t>
-          </a:r>
-          <a:endParaRPr lang="en-CA" sz="900" kern="1200" dirty="0"/>
-        </a:p>
-        <a:p>
-          <a:pPr marL="57150" lvl="1" indent="-57150" algn="l" defTabSz="400050">
-            <a:lnSpc>
-              <a:spcPct val="90000"/>
-            </a:lnSpc>
-            <a:spcBef>
-              <a:spcPct val="0"/>
-            </a:spcBef>
-            <a:spcAft>
-              <a:spcPct val="15000"/>
-            </a:spcAft>
-            <a:buFont typeface="+mj-lt"/>
-            <a:buAutoNum type="arabicPeriod"/>
-          </a:pPr>
-          <a:r>
-            <a:rPr lang="en-CA" sz="900" kern="1200"/>
-            <a:t>Create and run data processing pipeline</a:t>
-          </a:r>
-          <a:endParaRPr lang="en-CA" sz="900" kern="1200" dirty="0"/>
         </a:p>
         <a:p>
           <a:pPr marL="57150" lvl="1" indent="-57150" algn="l" defTabSz="400050">
@@ -8030,13 +8001,116 @@
           </a:pPr>
           <a:r>
             <a:rPr lang="en-CA" sz="900" kern="1200" dirty="0"/>
-            <a:t>Fit and transform pipeline</a:t>
+            <a:t>Create star values list (array) column.</a:t>
+          </a:r>
+        </a:p>
+        <a:p>
+          <a:pPr marL="57150" lvl="1" indent="-57150" algn="l" defTabSz="400050">
+            <a:lnSpc>
+              <a:spcPct val="90000"/>
+            </a:lnSpc>
+            <a:spcBef>
+              <a:spcPct val="0"/>
+            </a:spcBef>
+            <a:spcAft>
+              <a:spcPct val="15000"/>
+            </a:spcAft>
+            <a:buFont typeface="+mj-lt"/>
+            <a:buAutoNum type="arabicPeriod"/>
+          </a:pPr>
+          <a:r>
+            <a:rPr lang="en-CA" sz="900" kern="1200" dirty="0"/>
+            <a:t>Initialize Count Vectorizer and create a vector model</a:t>
+          </a:r>
+        </a:p>
+        <a:p>
+          <a:pPr marL="57150" lvl="1" indent="-57150" algn="l" defTabSz="400050">
+            <a:lnSpc>
+              <a:spcPct val="90000"/>
+            </a:lnSpc>
+            <a:spcBef>
+              <a:spcPct val="0"/>
+            </a:spcBef>
+            <a:spcAft>
+              <a:spcPct val="15000"/>
+            </a:spcAft>
+            <a:buFont typeface="+mj-lt"/>
+            <a:buAutoNum type="arabicPeriod"/>
+          </a:pPr>
+          <a:r>
+            <a:rPr lang="en-CA" sz="900" kern="1200" dirty="0"/>
+            <a:t>One hot encode the vector model as column to the </a:t>
+          </a:r>
+          <a:r>
+            <a:rPr lang="en-CA" sz="900" kern="1200" dirty="0" err="1"/>
+            <a:t>DataFrame</a:t>
+          </a:r>
+          <a:r>
+            <a:rPr lang="en-CA" sz="900" kern="1200" dirty="0"/>
+            <a:t>.</a:t>
+          </a:r>
+        </a:p>
+        <a:p>
+          <a:pPr marL="57150" lvl="1" indent="-57150" algn="l" defTabSz="400050">
+            <a:lnSpc>
+              <a:spcPct val="90000"/>
+            </a:lnSpc>
+            <a:spcBef>
+              <a:spcPct val="0"/>
+            </a:spcBef>
+            <a:spcAft>
+              <a:spcPct val="15000"/>
+            </a:spcAft>
+            <a:buFont typeface="+mj-lt"/>
+            <a:buAutoNum type="arabicPeriod"/>
+          </a:pPr>
+          <a:r>
+            <a:rPr lang="en-CA" sz="900" kern="1200" dirty="0"/>
+            <a:t>Create all features and feature vector.</a:t>
+          </a:r>
+        </a:p>
+        <a:p>
+          <a:pPr marL="57150" lvl="1" indent="-57150" algn="l" defTabSz="400050">
+            <a:lnSpc>
+              <a:spcPct val="90000"/>
+            </a:lnSpc>
+            <a:spcBef>
+              <a:spcPct val="0"/>
+            </a:spcBef>
+            <a:spcAft>
+              <a:spcPct val="15000"/>
+            </a:spcAft>
+            <a:buFont typeface="+mj-lt"/>
+            <a:buAutoNum type="arabicPeriod"/>
+          </a:pPr>
+          <a:r>
+            <a:rPr lang="en-CA" sz="900" kern="1200" dirty="0"/>
+            <a:t>Create and run data processing pipeline.</a:t>
+          </a:r>
+        </a:p>
+        <a:p>
+          <a:pPr marL="57150" lvl="1" indent="-57150" algn="l" defTabSz="400050">
+            <a:lnSpc>
+              <a:spcPct val="90000"/>
+            </a:lnSpc>
+            <a:spcBef>
+              <a:spcPct val="0"/>
+            </a:spcBef>
+            <a:spcAft>
+              <a:spcPct val="15000"/>
+            </a:spcAft>
+            <a:buFont typeface="+mj-lt"/>
+            <a:buAutoNum type="arabicPeriod"/>
+          </a:pPr>
+          <a:r>
+            <a:rPr lang="en-CA" sz="900" kern="1200" dirty="0"/>
+            <a:t>Fit and transform pipeline.</a:t>
           </a:r>
         </a:p>
       </dsp:txBody>
       <dsp:txXfrm>
-        <a:off x="6984312" y="2949122"/>
-        <a:ext cx="2473698" cy="1123737"/>
+        <a:off x="7004201" y="2951362"/>
+        <a:ext cx="2464820" cy="1119704"/>
       </dsp:txXfrm>
     </dsp:sp>
     <dsp:sp modelId="{1B57AD0B-ED91-43E0-BCEB-BCFE3AF74457}">
@@ -8046,8 +8120,8 @@
       </dsp:nvSpPr>
       <dsp:spPr>
         <a:xfrm>
-          <a:off x="8641747" y="1649573"/>
-          <a:ext cx="2171791" cy="2171791"/>
+          <a:off x="8655688" y="1656476"/>
+          <a:ext cx="2163998" cy="2163998"/>
         </a:xfrm>
         <a:prstGeom prst="circularArrow">
           <a:avLst>
@@ -8094,8 +8168,8 @@
       </dsp:nvSpPr>
       <dsp:spPr>
         <a:xfrm>
-          <a:off x="8127406" y="2126565"/>
-          <a:ext cx="1540565" cy="612632"/>
+          <a:off x="8143193" y="2131757"/>
+          <a:ext cx="1535037" cy="610433"/>
         </a:xfrm>
         <a:prstGeom prst="roundRect">
           <a:avLst>
@@ -8162,8 +8236,8 @@
         </a:p>
       </dsp:txBody>
       <dsp:txXfrm>
-        <a:off x="8145349" y="2144508"/>
-        <a:ext cx="1504679" cy="576746"/>
+        <a:off x="8161072" y="2149636"/>
+        <a:ext cx="1499279" cy="574675"/>
       </dsp:txXfrm>
     </dsp:sp>
     <dsp:sp modelId="{B70387AF-3C9B-4E09-B2A1-3CDB21B2816D}">
@@ -8173,8 +8247,8 @@
       </dsp:nvSpPr>
       <dsp:spPr>
         <a:xfrm>
-          <a:off x="9711800" y="2596720"/>
-          <a:ext cx="2293788" cy="1519203"/>
+          <a:off x="9721901" y="2600224"/>
+          <a:ext cx="2285557" cy="1513751"/>
         </a:xfrm>
         <a:prstGeom prst="roundRect">
           <a:avLst>
@@ -8236,7 +8310,7 @@
           </a:pPr>
           <a:r>
             <a:rPr lang="en-CA" sz="900" kern="1200" dirty="0"/>
-            <a:t>Drop intermediate columns so ‘features’ and ‘labels’ are only ones</a:t>
+            <a:t>Drop intermediate columns so ‘features’ and ‘labels’ are only ones.</a:t>
           </a:r>
         </a:p>
         <a:p>
@@ -8255,7 +8329,7 @@
           </a:pPr>
           <a:r>
             <a:rPr lang="en-CA" sz="900" kern="1200" dirty="0"/>
-            <a:t>Change data type of ‘label’ (stars) to int</a:t>
+            <a:t>Change data type of ‘label’ (stars) to int.</a:t>
           </a:r>
         </a:p>
         <a:p>
@@ -8274,7 +8348,7 @@
           </a:pPr>
           <a:r>
             <a:rPr lang="en-CA" sz="900" kern="1200" dirty="0"/>
-            <a:t>Split data into training and testing sets</a:t>
+            <a:t>Split data into training and testing sets.</a:t>
           </a:r>
         </a:p>
         <a:p>
@@ -8293,7 +8367,7 @@
           </a:pPr>
           <a:r>
             <a:rPr lang="en-CA" sz="900" kern="1200" dirty="0"/>
-            <a:t> (Naïve Bayes / Logistic Regression): Create model and fit training data / (Neural Net): Specify layers, create and train model</a:t>
+            <a:t> (Naïve Bayes / Logistic Regression): Create model and fit training data / (Neural Net): Specify layers, create and train model.</a:t>
           </a:r>
         </a:p>
         <a:p>
@@ -8312,13 +8386,13 @@
           </a:pPr>
           <a:r>
             <a:rPr lang="en-CA" sz="900" kern="1200" dirty="0"/>
-            <a:t>Display accuracy of model prediction of rating</a:t>
+            <a:t>Display accuracy of model prediction of rating.</a:t>
           </a:r>
         </a:p>
       </dsp:txBody>
       <dsp:txXfrm>
-        <a:off x="9746761" y="2631681"/>
-        <a:ext cx="2223866" cy="1123737"/>
+        <a:off x="9756737" y="2635060"/>
+        <a:ext cx="2215885" cy="1119704"/>
       </dsp:txXfrm>
     </dsp:sp>
     <dsp:sp modelId="{1AACCFC4-407A-41E6-960F-0CCFFD36C6D3}">
@@ -8328,8 +8402,8 @@
       </dsp:nvSpPr>
       <dsp:spPr>
         <a:xfrm>
-          <a:off x="10473418" y="3800864"/>
-          <a:ext cx="1540565" cy="612632"/>
+          <a:off x="10480786" y="3800047"/>
+          <a:ext cx="1535037" cy="610433"/>
         </a:xfrm>
         <a:prstGeom prst="roundRect">
           <a:avLst>
@@ -8396,8 +8470,8 @@
         </a:p>
       </dsp:txBody>
       <dsp:txXfrm>
-        <a:off x="10491361" y="3818807"/>
-        <a:ext cx="1504679" cy="576746"/>
+        <a:off x="10498665" y="3817926"/>
+        <a:ext cx="1499279" cy="574675"/>
       </dsp:txXfrm>
     </dsp:sp>
   </dsp:spTree>
@@ -12640,7 +12714,7 @@
           <a:p>
             <a:fld id="{FE07523A-9918-4474-B554-9AB7DCF0E552}" type="datetimeFigureOut">
               <a:rPr lang="en-CA" smtClean="0"/>
-              <a:t>2020-07-30</a:t>
+              <a:t>2020-08-01</a:t>
             </a:fld>
             <a:endParaRPr lang="en-CA"/>
           </a:p>
@@ -13306,63 +13380,15 @@
             </a:r>
           </a:p>
           <a:p>
-            <a:r>
-              <a:rPr lang="en-CA" sz="1200" kern="1200" dirty="0">
-                <a:solidFill>
-                  <a:schemeClr val="tx1"/>
-                </a:solidFill>
-                <a:effectLst/>
-                <a:latin typeface="+mn-lt"/>
-                <a:ea typeface="+mn-ea"/>
-                <a:cs typeface="+mn-cs"/>
-              </a:rPr>
-              <a:t> </a:t>
-            </a:r>
-          </a:p>
-          <a:p>
-            <a:r>
-              <a:rPr lang="en-CA" sz="1200" kern="1200" dirty="0">
-                <a:solidFill>
-                  <a:schemeClr val="tx1"/>
-                </a:solidFill>
-                <a:effectLst/>
-                <a:latin typeface="+mn-lt"/>
-                <a:ea typeface="+mn-ea"/>
-                <a:cs typeface="+mn-cs"/>
-              </a:rPr>
-              <a:t>Unfortunately, the resampled data showed similar patterns to those observed in the sample dataset.</a:t>
-            </a:r>
-          </a:p>
-          <a:p>
-            <a:r>
-              <a:rPr lang="en-CA" sz="1200" kern="1200" dirty="0">
-                <a:solidFill>
-                  <a:schemeClr val="tx1"/>
-                </a:solidFill>
-                <a:effectLst/>
-                <a:latin typeface="+mn-lt"/>
-                <a:ea typeface="+mn-ea"/>
-                <a:cs typeface="+mn-cs"/>
-              </a:rPr>
-              <a:t> </a:t>
-            </a:r>
-          </a:p>
-          <a:p>
-            <a:r>
-              <a:rPr lang="en-CA" sz="1200" kern="1200" dirty="0">
-                <a:solidFill>
-                  <a:schemeClr val="tx1"/>
-                </a:solidFill>
-                <a:effectLst/>
-                <a:latin typeface="+mn-lt"/>
-                <a:ea typeface="+mn-ea"/>
-                <a:cs typeface="+mn-cs"/>
-              </a:rPr>
-              <a:t>We concluded that star rating does not seem to influence any of the factors considered in such a profound way. At a higher level, this demonstrates the need for NLP analysis to predict sentiment.</a:t>
-            </a:r>
-          </a:p>
-          <a:p>
-            <a:endParaRPr lang="en-CA" dirty="0"/>
+            <a:endParaRPr lang="en-CA" sz="1200" kern="1200" dirty="0">
+              <a:solidFill>
+                <a:schemeClr val="tx1"/>
+              </a:solidFill>
+              <a:effectLst/>
+              <a:latin typeface="+mn-lt"/>
+              <a:ea typeface="+mn-ea"/>
+              <a:cs typeface="+mn-cs"/>
+            </a:endParaRPr>
           </a:p>
         </p:txBody>
       </p:sp>
@@ -13456,114 +13482,6 @@
                 <a:ea typeface="+mn-ea"/>
                 <a:cs typeface="+mn-cs"/>
               </a:rPr>
-              <a:t>Using the sample dataset, the exploratory analysis and plotting revealed that there was an uneven distribution of reviews across the different star ratings, with most of the set being 4 and 5-star reviews. Despite the imbalance, we created various plots that looked at review text length, useful votes, cool votes, and funny votes to see if there were patterns that could be observed on the basis of star rating.</a:t>
-            </a:r>
-          </a:p>
-          <a:p>
-            <a:r>
-              <a:rPr lang="en-CA" sz="1200" kern="1200" dirty="0">
-                <a:solidFill>
-                  <a:schemeClr val="tx1"/>
-                </a:solidFill>
-                <a:effectLst/>
-                <a:latin typeface="+mn-lt"/>
-                <a:ea typeface="+mn-ea"/>
-                <a:cs typeface="+mn-cs"/>
-              </a:rPr>
-              <a:t> </a:t>
-            </a:r>
-          </a:p>
-          <a:p>
-            <a:r>
-              <a:rPr lang="en-CA" sz="1200" kern="1200" dirty="0">
-                <a:solidFill>
-                  <a:schemeClr val="tx1"/>
-                </a:solidFill>
-                <a:effectLst/>
-                <a:latin typeface="+mn-lt"/>
-                <a:ea typeface="+mn-ea"/>
-                <a:cs typeface="+mn-cs"/>
-              </a:rPr>
-              <a:t>We discovered immediately that there did not appear to be much variation between a 1-star review and a 5-star review across all metrics.</a:t>
-            </a:r>
-          </a:p>
-          <a:p>
-            <a:r>
-              <a:rPr lang="en-CA" sz="1200" kern="1200" dirty="0">
-                <a:solidFill>
-                  <a:schemeClr val="tx1"/>
-                </a:solidFill>
-                <a:effectLst/>
-                <a:latin typeface="+mn-lt"/>
-                <a:ea typeface="+mn-ea"/>
-                <a:cs typeface="+mn-cs"/>
-              </a:rPr>
-              <a:t> </a:t>
-            </a:r>
-          </a:p>
-          <a:p>
-            <a:r>
-              <a:rPr lang="en-CA" sz="1200" kern="1200" dirty="0">
-                <a:solidFill>
-                  <a:schemeClr val="tx1"/>
-                </a:solidFill>
-                <a:effectLst/>
-                <a:latin typeface="+mn-lt"/>
-                <a:ea typeface="+mn-ea"/>
-                <a:cs typeface="+mn-cs"/>
-              </a:rPr>
-              <a:t>In hopes of discovering more compelling patterns that might exist, we decided to draw from the larger dataset to see if this would make a difference. Based on the technical limitations of </a:t>
-            </a:r>
-            <a:r>
-              <a:rPr lang="en-CA" sz="1200" kern="1200" dirty="0" err="1">
-                <a:solidFill>
-                  <a:schemeClr val="tx1"/>
-                </a:solidFill>
-                <a:effectLst/>
-                <a:latin typeface="+mn-lt"/>
-                <a:ea typeface="+mn-ea"/>
-                <a:cs typeface="+mn-cs"/>
-              </a:rPr>
-              <a:t>Colab</a:t>
-            </a:r>
-            <a:r>
-              <a:rPr lang="en-CA" sz="1200" kern="1200" dirty="0">
-                <a:solidFill>
-                  <a:schemeClr val="tx1"/>
-                </a:solidFill>
-                <a:effectLst/>
-                <a:latin typeface="+mn-lt"/>
-                <a:ea typeface="+mn-ea"/>
-                <a:cs typeface="+mn-cs"/>
-              </a:rPr>
-              <a:t>, we realised that sampling more than 10 thousand rows would not be possible, so we decided to sample 10 thousand rows, ensuring equal representation from each star rating.</a:t>
-            </a:r>
-          </a:p>
-          <a:p>
-            <a:r>
-              <a:rPr lang="en-CA" sz="1200" kern="1200" dirty="0">
-                <a:solidFill>
-                  <a:schemeClr val="tx1"/>
-                </a:solidFill>
-                <a:effectLst/>
-                <a:latin typeface="+mn-lt"/>
-                <a:ea typeface="+mn-ea"/>
-                <a:cs typeface="+mn-cs"/>
-              </a:rPr>
-              <a:t> </a:t>
-            </a:r>
-          </a:p>
-          <a:p>
-            <a:r>
-              <a:rPr lang="en-CA" sz="1200" kern="1200" dirty="0">
-                <a:solidFill>
-                  <a:schemeClr val="tx1"/>
-                </a:solidFill>
-                <a:effectLst/>
-                <a:latin typeface="+mn-lt"/>
-                <a:ea typeface="+mn-ea"/>
-                <a:cs typeface="+mn-cs"/>
-              </a:rPr>
               <a:t>Unfortunately, the resampled data showed similar patterns to those observed in the sample dataset.</a:t>
             </a:r>
           </a:p>
@@ -13690,114 +13608,6 @@
                 <a:ea typeface="+mn-ea"/>
                 <a:cs typeface="+mn-cs"/>
               </a:rPr>
-              <a:t>Using the sample dataset, the exploratory analysis and plotting revealed that there was an uneven distribution of reviews across the different star ratings, with most of the set being 4 and 5-star reviews. Despite the imbalance, we created various plots that looked at review text length, useful votes, cool votes, and funny votes to see if there were patterns that could be observed on the basis of star rating.</a:t>
-            </a:r>
-          </a:p>
-          <a:p>
-            <a:r>
-              <a:rPr lang="en-CA" sz="1200" kern="1200" dirty="0">
-                <a:solidFill>
-                  <a:schemeClr val="tx1"/>
-                </a:solidFill>
-                <a:effectLst/>
-                <a:latin typeface="+mn-lt"/>
-                <a:ea typeface="+mn-ea"/>
-                <a:cs typeface="+mn-cs"/>
-              </a:rPr>
-              <a:t> </a:t>
-            </a:r>
-          </a:p>
-          <a:p>
-            <a:r>
-              <a:rPr lang="en-CA" sz="1200" kern="1200" dirty="0">
-                <a:solidFill>
-                  <a:schemeClr val="tx1"/>
-                </a:solidFill>
-                <a:effectLst/>
-                <a:latin typeface="+mn-lt"/>
-                <a:ea typeface="+mn-ea"/>
-                <a:cs typeface="+mn-cs"/>
-              </a:rPr>
-              <a:t>We discovered immediately that there did not appear to be much variation between a 1-star review and a 5-star review across all metrics.</a:t>
-            </a:r>
-          </a:p>
-          <a:p>
-            <a:r>
-              <a:rPr lang="en-CA" sz="1200" kern="1200" dirty="0">
-                <a:solidFill>
-                  <a:schemeClr val="tx1"/>
-                </a:solidFill>
-                <a:effectLst/>
-                <a:latin typeface="+mn-lt"/>
-                <a:ea typeface="+mn-ea"/>
-                <a:cs typeface="+mn-cs"/>
-              </a:rPr>
-              <a:t> </a:t>
-            </a:r>
-          </a:p>
-          <a:p>
-            <a:r>
-              <a:rPr lang="en-CA" sz="1200" kern="1200" dirty="0">
-                <a:solidFill>
-                  <a:schemeClr val="tx1"/>
-                </a:solidFill>
-                <a:effectLst/>
-                <a:latin typeface="+mn-lt"/>
-                <a:ea typeface="+mn-ea"/>
-                <a:cs typeface="+mn-cs"/>
-              </a:rPr>
-              <a:t>In hopes of discovering more compelling patterns that might exist, we decided to draw from the larger dataset to see if this would make a difference. Based on the technical limitations of </a:t>
-            </a:r>
-            <a:r>
-              <a:rPr lang="en-CA" sz="1200" kern="1200" dirty="0" err="1">
-                <a:solidFill>
-                  <a:schemeClr val="tx1"/>
-                </a:solidFill>
-                <a:effectLst/>
-                <a:latin typeface="+mn-lt"/>
-                <a:ea typeface="+mn-ea"/>
-                <a:cs typeface="+mn-cs"/>
-              </a:rPr>
-              <a:t>Colab</a:t>
-            </a:r>
-            <a:r>
-              <a:rPr lang="en-CA" sz="1200" kern="1200" dirty="0">
-                <a:solidFill>
-                  <a:schemeClr val="tx1"/>
-                </a:solidFill>
-                <a:effectLst/>
-                <a:latin typeface="+mn-lt"/>
-                <a:ea typeface="+mn-ea"/>
-                <a:cs typeface="+mn-cs"/>
-              </a:rPr>
-              <a:t>, we realised that sampling more than 10 thousand rows would not be possible, so we decided to sample 10 thousand rows, ensuring equal representation from each star rating.</a:t>
-            </a:r>
-          </a:p>
-          <a:p>
-            <a:r>
-              <a:rPr lang="en-CA" sz="1200" kern="1200" dirty="0">
-                <a:solidFill>
-                  <a:schemeClr val="tx1"/>
-                </a:solidFill>
-                <a:effectLst/>
-                <a:latin typeface="+mn-lt"/>
-                <a:ea typeface="+mn-ea"/>
-                <a:cs typeface="+mn-cs"/>
-              </a:rPr>
-              <a:t> </a:t>
-            </a:r>
-          </a:p>
-          <a:p>
-            <a:r>
-              <a:rPr lang="en-CA" sz="1200" kern="1200" dirty="0">
-                <a:solidFill>
-                  <a:schemeClr val="tx1"/>
-                </a:solidFill>
-                <a:effectLst/>
-                <a:latin typeface="+mn-lt"/>
-                <a:ea typeface="+mn-ea"/>
-                <a:cs typeface="+mn-cs"/>
-              </a:rPr>
               <a:t>Unfortunately, the resampled data showed similar patterns to those observed in the sample dataset.</a:t>
             </a:r>
           </a:p>
@@ -13924,114 +13734,6 @@
                 <a:ea typeface="+mn-ea"/>
                 <a:cs typeface="+mn-cs"/>
               </a:rPr>
-              <a:t>Using the sample dataset, the exploratory analysis and plotting revealed that there was an uneven distribution of reviews across the different star ratings, with most of the set being 4 and 5-star reviews. Despite the imbalance, we created various plots that looked at review text length, useful votes, cool votes, and funny votes to see if there were patterns that could be observed on the basis of star rating.</a:t>
-            </a:r>
-          </a:p>
-          <a:p>
-            <a:r>
-              <a:rPr lang="en-CA" sz="1200" kern="1200" dirty="0">
-                <a:solidFill>
-                  <a:schemeClr val="tx1"/>
-                </a:solidFill>
-                <a:effectLst/>
-                <a:latin typeface="+mn-lt"/>
-                <a:ea typeface="+mn-ea"/>
-                <a:cs typeface="+mn-cs"/>
-              </a:rPr>
-              <a:t> </a:t>
-            </a:r>
-          </a:p>
-          <a:p>
-            <a:r>
-              <a:rPr lang="en-CA" sz="1200" kern="1200" dirty="0">
-                <a:solidFill>
-                  <a:schemeClr val="tx1"/>
-                </a:solidFill>
-                <a:effectLst/>
-                <a:latin typeface="+mn-lt"/>
-                <a:ea typeface="+mn-ea"/>
-                <a:cs typeface="+mn-cs"/>
-              </a:rPr>
-              <a:t>We discovered immediately that there did not appear to be much variation between a 1-star review and a 5-star review across all metrics.</a:t>
-            </a:r>
-          </a:p>
-          <a:p>
-            <a:r>
-              <a:rPr lang="en-CA" sz="1200" kern="1200" dirty="0">
-                <a:solidFill>
-                  <a:schemeClr val="tx1"/>
-                </a:solidFill>
-                <a:effectLst/>
-                <a:latin typeface="+mn-lt"/>
-                <a:ea typeface="+mn-ea"/>
-                <a:cs typeface="+mn-cs"/>
-              </a:rPr>
-              <a:t> </a:t>
-            </a:r>
-          </a:p>
-          <a:p>
-            <a:r>
-              <a:rPr lang="en-CA" sz="1200" kern="1200" dirty="0">
-                <a:solidFill>
-                  <a:schemeClr val="tx1"/>
-                </a:solidFill>
-                <a:effectLst/>
-                <a:latin typeface="+mn-lt"/>
-                <a:ea typeface="+mn-ea"/>
-                <a:cs typeface="+mn-cs"/>
-              </a:rPr>
-              <a:t>In hopes of discovering more compelling patterns that might exist, we decided to draw from the larger dataset to see if this would make a difference. Based on the technical limitations of </a:t>
-            </a:r>
-            <a:r>
-              <a:rPr lang="en-CA" sz="1200" kern="1200" dirty="0" err="1">
-                <a:solidFill>
-                  <a:schemeClr val="tx1"/>
-                </a:solidFill>
-                <a:effectLst/>
-                <a:latin typeface="+mn-lt"/>
-                <a:ea typeface="+mn-ea"/>
-                <a:cs typeface="+mn-cs"/>
-              </a:rPr>
-              <a:t>Colab</a:t>
-            </a:r>
-            <a:r>
-              <a:rPr lang="en-CA" sz="1200" kern="1200" dirty="0">
-                <a:solidFill>
-                  <a:schemeClr val="tx1"/>
-                </a:solidFill>
-                <a:effectLst/>
-                <a:latin typeface="+mn-lt"/>
-                <a:ea typeface="+mn-ea"/>
-                <a:cs typeface="+mn-cs"/>
-              </a:rPr>
-              <a:t>, we realised that sampling more than 10 thousand rows would not be possible, so we decided to sample 10 thousand rows, ensuring equal representation from each star rating.</a:t>
-            </a:r>
-          </a:p>
-          <a:p>
-            <a:r>
-              <a:rPr lang="en-CA" sz="1200" kern="1200" dirty="0">
-                <a:solidFill>
-                  <a:schemeClr val="tx1"/>
-                </a:solidFill>
-                <a:effectLst/>
-                <a:latin typeface="+mn-lt"/>
-                <a:ea typeface="+mn-ea"/>
-                <a:cs typeface="+mn-cs"/>
-              </a:rPr>
-              <a:t> </a:t>
-            </a:r>
-          </a:p>
-          <a:p>
-            <a:r>
-              <a:rPr lang="en-CA" sz="1200" kern="1200" dirty="0">
-                <a:solidFill>
-                  <a:schemeClr val="tx1"/>
-                </a:solidFill>
-                <a:effectLst/>
-                <a:latin typeface="+mn-lt"/>
-                <a:ea typeface="+mn-ea"/>
-                <a:cs typeface="+mn-cs"/>
-              </a:rPr>
               <a:t>Unfortunately, the resampled data showed similar patterns to those observed in the sample dataset.</a:t>
             </a:r>
           </a:p>
@@ -14288,7 +13990,7 @@
                 <a:ea typeface="+mn-ea"/>
                 <a:cs typeface="+mn-cs"/>
               </a:rPr>
-              <a:t>Originally, we'd hoped to build a model for predicting the exact number of stars based on NLP machine learning; however, we opted to include binary classification as well as multiclass categories where there are 3 classes in addition to 5 classes. The decision to include binary and 3-category classification was due to the model predictions were initially quite low in terms of accuracy when predicting the exact number of stars.</a:t>
+              <a:t>Detailed process is explained in the boxes above; </a:t>
             </a:r>
             <a:endParaRPr lang="en-CA" dirty="0"/>
           </a:p>
@@ -14321,6 +14023,93 @@
     <p:extLst>
       <p:ext uri="{BB962C8B-B14F-4D97-AF65-F5344CB8AC3E}">
         <p14:creationId xmlns:p14="http://schemas.microsoft.com/office/powerpoint/2010/main" val="89144666"/>
+      </p:ext>
+    </p:extLst>
+  </p:cSld>
+  <p:clrMapOvr>
+    <a:masterClrMapping/>
+  </p:clrMapOvr>
+</p:notes>
+</file>
+
+<file path=ppt/notesSlides/notesSlide9.xml><?xml version="1.0" encoding="utf-8"?>
+<p:notes xmlns:a="http://schemas.openxmlformats.org/drawingml/2006/main" xmlns:r="http://schemas.openxmlformats.org/officeDocument/2006/relationships" xmlns:p="http://schemas.openxmlformats.org/presentationml/2006/main">
+  <p:cSld>
+    <p:spTree>
+      <p:nvGrpSpPr>
+        <p:cNvPr id="1" name=""/>
+        <p:cNvGrpSpPr/>
+        <p:nvPr/>
+      </p:nvGrpSpPr>
+      <p:grpSpPr>
+        <a:xfrm>
+          <a:off x="0" y="0"/>
+          <a:ext cx="0" cy="0"/>
+          <a:chOff x="0" y="0"/>
+          <a:chExt cx="0" cy="0"/>
+        </a:xfrm>
+      </p:grpSpPr>
+      <p:sp>
+        <p:nvSpPr>
+          <p:cNvPr id="2" name="Slide Image Placeholder 1"/>
+          <p:cNvSpPr>
+            <a:spLocks noGrp="1" noRot="1" noChangeAspect="1"/>
+          </p:cNvSpPr>
+          <p:nvPr>
+            <p:ph type="sldImg"/>
+          </p:nvPr>
+        </p:nvSpPr>
+        <p:spPr/>
+      </p:sp>
+      <p:sp>
+        <p:nvSpPr>
+          <p:cNvPr id="3" name="Notes Placeholder 2"/>
+          <p:cNvSpPr>
+            <a:spLocks noGrp="1"/>
+          </p:cNvSpPr>
+          <p:nvPr>
+            <p:ph type="body" idx="1"/>
+          </p:nvPr>
+        </p:nvSpPr>
+        <p:spPr/>
+        <p:txBody>
+          <a:bodyPr/>
+          <a:lstStyle/>
+          <a:p>
+            <a:r>
+              <a:rPr lang="en-CA" dirty="0"/>
+              <a:t>Take a few minutes to show the dashboard and do a live demo.</a:t>
+            </a:r>
+          </a:p>
+        </p:txBody>
+      </p:sp>
+      <p:sp>
+        <p:nvSpPr>
+          <p:cNvPr id="4" name="Slide Number Placeholder 3"/>
+          <p:cNvSpPr>
+            <a:spLocks noGrp="1"/>
+          </p:cNvSpPr>
+          <p:nvPr>
+            <p:ph type="sldNum" sz="quarter" idx="5"/>
+          </p:nvPr>
+        </p:nvSpPr>
+        <p:spPr/>
+        <p:txBody>
+          <a:bodyPr/>
+          <a:lstStyle/>
+          <a:p>
+            <a:fld id="{943012F3-EFBB-4220-B725-9B1359B19F49}" type="slidenum">
+              <a:rPr lang="en-CA" smtClean="0"/>
+              <a:t>13</a:t>
+            </a:fld>
+            <a:endParaRPr lang="en-CA"/>
+          </a:p>
+        </p:txBody>
+      </p:sp>
+    </p:spTree>
+    <p:extLst>
+      <p:ext uri="{BB962C8B-B14F-4D97-AF65-F5344CB8AC3E}">
+        <p14:creationId xmlns:p14="http://schemas.microsoft.com/office/powerpoint/2010/main" val="1282601095"/>
       </p:ext>
     </p:extLst>
   </p:cSld>
@@ -19319,7 +19108,7 @@
           <p:nvPr>
             <p:extLst>
               <p:ext uri="{D42A27DB-BD31-4B8C-83A1-F6EECF244321}">
-                <p14:modId xmlns:p14="http://schemas.microsoft.com/office/powerpoint/2010/main" val="702991321"/>
+                <p14:modId xmlns:p14="http://schemas.microsoft.com/office/powerpoint/2010/main" val="3691110820"/>
               </p:ext>
             </p:extLst>
           </p:nvPr>
@@ -20024,15 +19813,50 @@
             </a:r>
             <a:r>
               <a:rPr lang="en-CA" sz="3200" dirty="0"/>
-              <a:t> because it uses too much RAM, even when reducing </a:t>
-            </a:r>
-            <a:r>
-              <a:rPr lang="en-CA" sz="3200"/>
-              <a:t>the size </a:t>
-            </a:r>
+              <a:t> because it uses too much RAM, even when reducing the size of the dataset.</a:t>
+            </a:r>
+            <a:endParaRPr lang="en-CA" sz="1400" dirty="0"/>
+          </a:p>
+        </p:txBody>
+      </p:sp>
+      <p:sp>
+        <p:nvSpPr>
+          <p:cNvPr id="9" name="TextBox 8">
+            <a:extLst>
+              <a:ext uri="{FF2B5EF4-FFF2-40B4-BE49-F238E27FC236}">
+                <a16:creationId xmlns:a16="http://schemas.microsoft.com/office/drawing/2014/main" id="{E7DEE063-D8A0-4E32-8540-091E32CB8424}"/>
+              </a:ext>
+            </a:extLst>
+          </p:cNvPr>
+          <p:cNvSpPr txBox="1"/>
+          <p:nvPr/>
+        </p:nvSpPr>
+        <p:spPr>
+          <a:xfrm>
+            <a:off x="7450376" y="5495684"/>
+            <a:ext cx="4527864" cy="584775"/>
+          </a:xfrm>
+          <a:prstGeom prst="rect">
+            <a:avLst/>
+          </a:prstGeom>
+          <a:noFill/>
+        </p:spPr>
+        <p:txBody>
+          <a:bodyPr wrap="square" rtlCol="0">
+            <a:spAutoFit/>
+          </a:bodyPr>
+          <a:lstStyle/>
+          <a:p>
+            <a:pPr marL="285750" indent="-285750">
+              <a:buClr>
+                <a:srgbClr val="BF2419"/>
+              </a:buClr>
+              <a:buFont typeface="Wingdings" panose="05000000000000000000" pitchFamily="2" charset="2"/>
+              <a:buChar char="«"/>
+            </a:pPr>
             <a:r>
               <a:rPr lang="en-CA" sz="3200" dirty="0"/>
-              <a:t>of the dataset.</a:t>
+              <a:t>[Link to Dashboard]</a:t>
             </a:r>
             <a:endParaRPr lang="en-CA" sz="1400" dirty="0"/>
           </a:p>
@@ -20113,17 +19937,38 @@
             <p:ph idx="1"/>
           </p:nvPr>
         </p:nvSpPr>
-        <p:spPr/>
+        <p:spPr>
+          <a:xfrm>
+            <a:off x="1097280" y="2108201"/>
+            <a:ext cx="10058400" cy="1017043"/>
+          </a:xfrm>
+        </p:spPr>
         <p:txBody>
-          <a:bodyPr/>
+          <a:bodyPr>
+            <a:normAutofit/>
+          </a:bodyPr>
           <a:lstStyle/>
           <a:p>
             <a:pPr marL="0" indent="0">
+              <a:spcBef>
+                <a:spcPts val="0"/>
+              </a:spcBef>
+              <a:spcAft>
+                <a:spcPts val="0"/>
+              </a:spcAft>
               <a:buNone/>
             </a:pPr>
             <a:r>
+              <a:rPr lang="en-CA" sz="2800" b="1" dirty="0">
+                <a:solidFill>
+                  <a:srgbClr val="BF2419"/>
+                </a:solidFill>
+              </a:rPr>
+              <a:t>Technologies / Tools:</a:t>
+            </a:r>
+            <a:r>
               <a:rPr lang="en-CA" dirty="0"/>
-              <a:t>Technologies / Tools: Google Cloud Storage, Google </a:t>
+              <a:t> Google Cloud Storage, Google </a:t>
             </a:r>
             <a:r>
               <a:rPr lang="en-CA" dirty="0" err="1"/>
@@ -20141,156 +19986,29 @@
           </a:p>
           <a:p>
             <a:pPr marL="0" indent="0">
+              <a:spcBef>
+                <a:spcPts val="0"/>
+              </a:spcBef>
+              <a:spcAft>
+                <a:spcPts val="0"/>
+              </a:spcAft>
               <a:buNone/>
             </a:pPr>
             <a:r>
+              <a:rPr lang="en-CA" sz="2800" b="1" dirty="0">
+                <a:solidFill>
+                  <a:srgbClr val="BF2419"/>
+                </a:solidFill>
+              </a:rPr>
+              <a:t>Languages:</a:t>
+            </a:r>
+            <a:r>
+              <a:rPr lang="en-CA" sz="1800" dirty="0"/>
+              <a:t> </a:t>
+            </a:r>
+            <a:r>
               <a:rPr lang="en-CA" dirty="0"/>
-              <a:t>Languages: Python</a:t>
-            </a:r>
-          </a:p>
-          <a:p>
-            <a:pPr marL="0" indent="0">
-              <a:buNone/>
-            </a:pPr>
-            <a:r>
-              <a:rPr lang="en-CA" dirty="0"/>
-              <a:t>Libraries: Pandas, </a:t>
-            </a:r>
-            <a:r>
-              <a:rPr lang="en-CA" dirty="0" err="1"/>
-              <a:t>os</a:t>
-            </a:r>
-            <a:r>
-              <a:rPr lang="en-CA" dirty="0"/>
-              <a:t>, </a:t>
-            </a:r>
-            <a:r>
-              <a:rPr lang="en-CA" dirty="0" err="1"/>
-              <a:t>findspark</a:t>
-            </a:r>
-            <a:r>
-              <a:rPr lang="en-CA" dirty="0"/>
-              <a:t>, </a:t>
-            </a:r>
-            <a:r>
-              <a:rPr lang="en-CA" dirty="0" err="1"/>
-              <a:t>pyspark.sql</a:t>
-            </a:r>
-            <a:r>
-              <a:rPr lang="en-CA" dirty="0"/>
-              <a:t>, </a:t>
-            </a:r>
-            <a:r>
-              <a:rPr lang="en-CA" dirty="0" err="1"/>
-              <a:t>nltk</a:t>
-            </a:r>
-            <a:r>
-              <a:rPr lang="en-CA" dirty="0"/>
-              <a:t>, string, re, </a:t>
-            </a:r>
-            <a:r>
-              <a:rPr lang="en-CA" dirty="0" err="1"/>
-              <a:t>nltk.stem</a:t>
-            </a:r>
-            <a:r>
-              <a:rPr lang="en-CA" dirty="0"/>
-              <a:t> (</a:t>
-            </a:r>
-            <a:r>
-              <a:rPr lang="en-CA" dirty="0" err="1"/>
-              <a:t>PorterStemmer</a:t>
-            </a:r>
-            <a:r>
-              <a:rPr lang="en-CA" dirty="0"/>
-              <a:t>, </a:t>
-            </a:r>
-            <a:r>
-              <a:rPr lang="en-CA" dirty="0" err="1"/>
-              <a:t>WordNetLemmatizer</a:t>
-            </a:r>
-            <a:r>
-              <a:rPr lang="en-CA" dirty="0"/>
-              <a:t>), </a:t>
-            </a:r>
-            <a:r>
-              <a:rPr lang="en-CA" dirty="0" err="1"/>
-              <a:t>pyspark.ml.feature</a:t>
-            </a:r>
-            <a:r>
-              <a:rPr lang="en-CA" dirty="0"/>
-              <a:t> (</a:t>
-            </a:r>
-            <a:r>
-              <a:rPr lang="en-CA" dirty="0" err="1"/>
-              <a:t>HashingTF</a:t>
-            </a:r>
-            <a:r>
-              <a:rPr lang="en-CA" dirty="0"/>
-              <a:t>, IDF, </a:t>
-            </a:r>
-            <a:r>
-              <a:rPr lang="en-CA" dirty="0" err="1"/>
-              <a:t>VectorAssembler</a:t>
-            </a:r>
-            <a:r>
-              <a:rPr lang="en-CA" dirty="0"/>
-              <a:t>), </a:t>
-            </a:r>
-            <a:r>
-              <a:rPr lang="en-CA" dirty="0" err="1"/>
-              <a:t>pyspark.ml.linalg</a:t>
-            </a:r>
-            <a:r>
-              <a:rPr lang="en-CA" dirty="0"/>
-              <a:t> (Vector), pyspark.ml (Pipeline), </a:t>
-            </a:r>
-            <a:r>
-              <a:rPr lang="en-CA" dirty="0" err="1"/>
-              <a:t>pyspark.ml.classification</a:t>
-            </a:r>
-            <a:r>
-              <a:rPr lang="en-CA" dirty="0"/>
-              <a:t> (</a:t>
-            </a:r>
-            <a:r>
-              <a:rPr lang="en-CA" dirty="0" err="1"/>
-              <a:t>NaiveBayes</a:t>
-            </a:r>
-            <a:r>
-              <a:rPr lang="en-CA" dirty="0"/>
-              <a:t>, </a:t>
-            </a:r>
-            <a:r>
-              <a:rPr lang="en-CA" dirty="0" err="1"/>
-              <a:t>LogisticRegression</a:t>
-            </a:r>
-            <a:r>
-              <a:rPr lang="en-CA" dirty="0"/>
-              <a:t>, </a:t>
-            </a:r>
-            <a:r>
-              <a:rPr lang="en-CA" dirty="0" err="1"/>
-              <a:t>MultilayerPerceptronClassifier</a:t>
-            </a:r>
-            <a:r>
-              <a:rPr lang="en-CA" dirty="0"/>
-              <a:t>), </a:t>
-            </a:r>
-            <a:r>
-              <a:rPr lang="en-CA" dirty="0" err="1"/>
-              <a:t>pyspark.ml.evaluation</a:t>
-            </a:r>
-            <a:r>
-              <a:rPr lang="en-CA" dirty="0"/>
-              <a:t> (</a:t>
-            </a:r>
-            <a:r>
-              <a:rPr lang="en-CA" dirty="0" err="1"/>
-              <a:t>MulticlassClassificationEvaluator</a:t>
-            </a:r>
-            <a:r>
-              <a:rPr lang="en-CA" dirty="0"/>
-              <a:t>), </a:t>
+              <a:t>Python</a:t>
             </a:r>
           </a:p>
         </p:txBody>
@@ -20394,6 +20112,345 @@
               <a:t>14</a:t>
             </a:fld>
             <a:endParaRPr lang="en-US" dirty="0"/>
+          </a:p>
+        </p:txBody>
+      </p:sp>
+      <p:sp>
+        <p:nvSpPr>
+          <p:cNvPr id="7" name="TextBox 6">
+            <a:extLst>
+              <a:ext uri="{FF2B5EF4-FFF2-40B4-BE49-F238E27FC236}">
+                <a16:creationId xmlns:a16="http://schemas.microsoft.com/office/drawing/2014/main" id="{D89C2965-792B-482D-96E0-CDB6B64F094B}"/>
+              </a:ext>
+            </a:extLst>
+          </p:cNvPr>
+          <p:cNvSpPr txBox="1"/>
+          <p:nvPr/>
+        </p:nvSpPr>
+        <p:spPr>
+          <a:xfrm>
+            <a:off x="1014190" y="3192757"/>
+            <a:ext cx="10163620" cy="2031325"/>
+          </a:xfrm>
+          <a:prstGeom prst="rect">
+            <a:avLst/>
+          </a:prstGeom>
+          <a:noFill/>
+        </p:spPr>
+        <p:txBody>
+          <a:bodyPr wrap="square" numCol="3" rtlCol="0">
+            <a:spAutoFit/>
+          </a:bodyPr>
+          <a:lstStyle/>
+          <a:p>
+            <a:r>
+              <a:rPr lang="en-CA" sz="2800" b="1" dirty="0">
+                <a:solidFill>
+                  <a:srgbClr val="BF2419"/>
+                </a:solidFill>
+              </a:rPr>
+              <a:t>Libraries:</a:t>
+            </a:r>
+            <a:r>
+              <a:rPr lang="en-CA" dirty="0"/>
+              <a:t> </a:t>
+            </a:r>
+          </a:p>
+          <a:p>
+            <a:pPr>
+              <a:spcBef>
+                <a:spcPts val="0"/>
+              </a:spcBef>
+              <a:spcAft>
+                <a:spcPts val="0"/>
+              </a:spcAft>
+              <a:buFont typeface="Arial" panose="020B0604020202020204" pitchFamily="34" charset="0"/>
+              <a:buChar char="•"/>
+            </a:pPr>
+            <a:r>
+              <a:rPr lang="en-CA" dirty="0"/>
+              <a:t>Pandas</a:t>
+            </a:r>
+          </a:p>
+          <a:p>
+            <a:pPr>
+              <a:spcBef>
+                <a:spcPts val="0"/>
+              </a:spcBef>
+              <a:spcAft>
+                <a:spcPts val="0"/>
+              </a:spcAft>
+              <a:buFont typeface="Arial" panose="020B0604020202020204" pitchFamily="34" charset="0"/>
+              <a:buChar char="•"/>
+            </a:pPr>
+            <a:r>
+              <a:rPr lang="en-CA" dirty="0" err="1"/>
+              <a:t>Os</a:t>
+            </a:r>
+            <a:endParaRPr lang="en-CA" dirty="0"/>
+          </a:p>
+          <a:p>
+            <a:pPr>
+              <a:spcBef>
+                <a:spcPts val="0"/>
+              </a:spcBef>
+              <a:spcAft>
+                <a:spcPts val="0"/>
+              </a:spcAft>
+              <a:buFont typeface="Arial" panose="020B0604020202020204" pitchFamily="34" charset="0"/>
+              <a:buChar char="•"/>
+            </a:pPr>
+            <a:r>
+              <a:rPr lang="en-CA" dirty="0" err="1"/>
+              <a:t>findspark</a:t>
+            </a:r>
+            <a:endParaRPr lang="en-CA" dirty="0"/>
+          </a:p>
+          <a:p>
+            <a:pPr>
+              <a:spcBef>
+                <a:spcPts val="0"/>
+              </a:spcBef>
+              <a:spcAft>
+                <a:spcPts val="0"/>
+              </a:spcAft>
+              <a:buFont typeface="Arial" panose="020B0604020202020204" pitchFamily="34" charset="0"/>
+              <a:buChar char="•"/>
+            </a:pPr>
+            <a:r>
+              <a:rPr lang="en-CA" dirty="0" err="1"/>
+              <a:t>pyspark.sql</a:t>
+            </a:r>
+            <a:endParaRPr lang="en-CA" dirty="0"/>
+          </a:p>
+          <a:p>
+            <a:pPr>
+              <a:spcBef>
+                <a:spcPts val="0"/>
+              </a:spcBef>
+              <a:spcAft>
+                <a:spcPts val="0"/>
+              </a:spcAft>
+              <a:buFont typeface="Arial" panose="020B0604020202020204" pitchFamily="34" charset="0"/>
+              <a:buChar char="•"/>
+            </a:pPr>
+            <a:r>
+              <a:rPr lang="en-CA" dirty="0" err="1"/>
+              <a:t>nltk</a:t>
+            </a:r>
+            <a:endParaRPr lang="en-CA" dirty="0"/>
+          </a:p>
+          <a:p>
+            <a:pPr>
+              <a:spcBef>
+                <a:spcPts val="0"/>
+              </a:spcBef>
+              <a:spcAft>
+                <a:spcPts val="0"/>
+              </a:spcAft>
+              <a:buFont typeface="Arial" panose="020B0604020202020204" pitchFamily="34" charset="0"/>
+              <a:buChar char="•"/>
+            </a:pPr>
+            <a:r>
+              <a:rPr lang="en-CA" dirty="0" err="1"/>
+              <a:t>nltk.stem</a:t>
+            </a:r>
+            <a:r>
+              <a:rPr lang="en-CA" dirty="0"/>
+              <a:t> (</a:t>
+            </a:r>
+            <a:r>
+              <a:rPr lang="en-CA" dirty="0" err="1"/>
+              <a:t>PorterStemmer</a:t>
+            </a:r>
+            <a:r>
+              <a:rPr lang="en-CA" dirty="0"/>
+              <a:t>, </a:t>
+            </a:r>
+            <a:r>
+              <a:rPr lang="en-CA" dirty="0" err="1"/>
+              <a:t>WordNetLemmatizer</a:t>
+            </a:r>
+            <a:r>
+              <a:rPr lang="en-CA" dirty="0"/>
+              <a:t>)</a:t>
+            </a:r>
+          </a:p>
+          <a:p>
+            <a:pPr>
+              <a:spcBef>
+                <a:spcPts val="0"/>
+              </a:spcBef>
+              <a:spcAft>
+                <a:spcPts val="0"/>
+              </a:spcAft>
+              <a:buFont typeface="Arial" panose="020B0604020202020204" pitchFamily="34" charset="0"/>
+              <a:buChar char="•"/>
+            </a:pPr>
+            <a:r>
+              <a:rPr lang="en-CA" dirty="0"/>
+              <a:t>string</a:t>
+            </a:r>
+          </a:p>
+          <a:p>
+            <a:pPr>
+              <a:spcBef>
+                <a:spcPts val="0"/>
+              </a:spcBef>
+              <a:spcAft>
+                <a:spcPts val="0"/>
+              </a:spcAft>
+              <a:buFont typeface="Arial" panose="020B0604020202020204" pitchFamily="34" charset="0"/>
+              <a:buChar char="•"/>
+            </a:pPr>
+            <a:r>
+              <a:rPr lang="en-CA" dirty="0"/>
+              <a:t>Re</a:t>
+            </a:r>
+          </a:p>
+          <a:p>
+            <a:pPr>
+              <a:spcBef>
+                <a:spcPts val="0"/>
+              </a:spcBef>
+              <a:spcAft>
+                <a:spcPts val="0"/>
+              </a:spcAft>
+              <a:buFont typeface="Arial" panose="020B0604020202020204" pitchFamily="34" charset="0"/>
+              <a:buChar char="•"/>
+            </a:pPr>
+            <a:r>
+              <a:rPr lang="en-CA" dirty="0" err="1"/>
+              <a:t>pyspark.ml.feature</a:t>
+            </a:r>
+            <a:r>
+              <a:rPr lang="en-CA" dirty="0"/>
+              <a:t> (</a:t>
+            </a:r>
+            <a:r>
+              <a:rPr lang="en-CA" dirty="0" err="1"/>
+              <a:t>HashingTF</a:t>
+            </a:r>
+            <a:r>
+              <a:rPr lang="en-CA" dirty="0"/>
+              <a:t>, IDF, </a:t>
+            </a:r>
+            <a:r>
+              <a:rPr lang="en-CA" dirty="0" err="1"/>
+              <a:t>VectorAssembler</a:t>
+            </a:r>
+            <a:r>
+              <a:rPr lang="en-CA" dirty="0"/>
+              <a:t>)</a:t>
+            </a:r>
+          </a:p>
+          <a:p>
+            <a:pPr>
+              <a:spcBef>
+                <a:spcPts val="0"/>
+              </a:spcBef>
+              <a:spcAft>
+                <a:spcPts val="0"/>
+              </a:spcAft>
+              <a:buFont typeface="Arial" panose="020B0604020202020204" pitchFamily="34" charset="0"/>
+              <a:buChar char="•"/>
+            </a:pPr>
+            <a:r>
+              <a:rPr lang="en-CA" dirty="0" err="1"/>
+              <a:t>pyspark.ml.linalg</a:t>
+            </a:r>
+            <a:r>
+              <a:rPr lang="en-CA" dirty="0"/>
+              <a:t> (Vector)</a:t>
+            </a:r>
+          </a:p>
+          <a:p>
+            <a:pPr>
+              <a:spcBef>
+                <a:spcPts val="0"/>
+              </a:spcBef>
+              <a:spcAft>
+                <a:spcPts val="0"/>
+              </a:spcAft>
+              <a:buFont typeface="Arial" panose="020B0604020202020204" pitchFamily="34" charset="0"/>
+              <a:buChar char="•"/>
+            </a:pPr>
+            <a:r>
+              <a:rPr lang="en-CA" dirty="0"/>
+              <a:t>pyspark.ml (Pipeline)</a:t>
+            </a:r>
+          </a:p>
+          <a:p>
+            <a:pPr>
+              <a:spcBef>
+                <a:spcPts val="0"/>
+              </a:spcBef>
+              <a:spcAft>
+                <a:spcPts val="0"/>
+              </a:spcAft>
+              <a:buFont typeface="Arial" panose="020B0604020202020204" pitchFamily="34" charset="0"/>
+              <a:buChar char="•"/>
+            </a:pPr>
+            <a:r>
+              <a:rPr lang="en-CA" dirty="0" err="1"/>
+              <a:t>pyspark.ml.classification</a:t>
+            </a:r>
+            <a:r>
+              <a:rPr lang="en-CA" dirty="0"/>
+              <a:t> (</a:t>
+            </a:r>
+            <a:r>
+              <a:rPr lang="en-CA" dirty="0" err="1"/>
+              <a:t>NaiveBayes</a:t>
+            </a:r>
+            <a:r>
+              <a:rPr lang="en-CA" dirty="0"/>
+              <a:t>, </a:t>
+            </a:r>
+            <a:r>
+              <a:rPr lang="en-CA" dirty="0" err="1"/>
+              <a:t>LogisticRegression</a:t>
+            </a:r>
+            <a:r>
+              <a:rPr lang="en-CA" dirty="0"/>
+              <a:t>, </a:t>
+            </a:r>
+            <a:r>
+              <a:rPr lang="en-CA" dirty="0" err="1"/>
+              <a:t>MultilayerPerceptronClassifier</a:t>
+            </a:r>
+            <a:r>
+              <a:rPr lang="en-CA" dirty="0"/>
+              <a:t>)</a:t>
+            </a:r>
+          </a:p>
+          <a:p>
+            <a:pPr>
+              <a:spcBef>
+                <a:spcPts val="0"/>
+              </a:spcBef>
+              <a:spcAft>
+                <a:spcPts val="0"/>
+              </a:spcAft>
+              <a:buFont typeface="Arial" panose="020B0604020202020204" pitchFamily="34" charset="0"/>
+              <a:buChar char="•"/>
+            </a:pPr>
+            <a:r>
+              <a:rPr lang="en-CA" dirty="0" err="1"/>
+              <a:t>pyspark.ml.evaluation</a:t>
+            </a:r>
+            <a:r>
+              <a:rPr lang="en-CA" dirty="0"/>
+              <a:t> (</a:t>
+            </a:r>
+            <a:r>
+              <a:rPr lang="en-CA" dirty="0" err="1"/>
+              <a:t>MulticlassClassificationEvaluator</a:t>
+            </a:r>
+            <a:r>
+              <a:rPr lang="en-CA" dirty="0"/>
+              <a:t>)</a:t>
+            </a:r>
           </a:p>
         </p:txBody>
       </p:sp>
@@ -20474,10 +20531,37 @@
         </p:nvSpPr>
         <p:spPr/>
         <p:txBody>
-          <a:bodyPr/>
+          <a:bodyPr>
+            <a:normAutofit/>
+          </a:bodyPr>
           <a:lstStyle/>
           <a:p>
-            <a:endParaRPr lang="en-CA"/>
+            <a:pPr>
+              <a:buFont typeface="Wingdings" panose="05000000000000000000" pitchFamily="2" charset="2"/>
+              <a:buChar char="«"/>
+            </a:pPr>
+            <a:r>
+              <a:rPr lang="en-CA" sz="2800" dirty="0"/>
+              <a:t>For all the benefits of using Google Cloud Service, it turns out that Google </a:t>
+            </a:r>
+            <a:r>
+              <a:rPr lang="en-CA" sz="2800" dirty="0" err="1"/>
+              <a:t>Colab</a:t>
+            </a:r>
+            <a:r>
+              <a:rPr lang="en-CA" sz="2800" dirty="0"/>
+              <a:t> is unable to handle the volume of data our project had intended on using</a:t>
+            </a:r>
+          </a:p>
+          <a:p>
+            <a:pPr>
+              <a:buFont typeface="Wingdings" panose="05000000000000000000" pitchFamily="2" charset="2"/>
+              <a:buChar char="«"/>
+            </a:pPr>
+            <a:r>
+              <a:rPr lang="en-CA" sz="2800" dirty="0"/>
+              <a:t>If there had been more time, we may have allocated more time to researching cost-effective solutions that can handle big data and run a neural network machine learning model</a:t>
+            </a:r>
           </a:p>
         </p:txBody>
       </p:sp>
@@ -20629,31 +20713,6 @@
       </p:sp>
       <p:sp>
         <p:nvSpPr>
-          <p:cNvPr id="3" name="Content Placeholder 2">
-            <a:extLst>
-              <a:ext uri="{FF2B5EF4-FFF2-40B4-BE49-F238E27FC236}">
-                <a16:creationId xmlns:a16="http://schemas.microsoft.com/office/drawing/2014/main" id="{7DD044CB-16C9-4730-ADDE-4E884EC9DFDA}"/>
-              </a:ext>
-            </a:extLst>
-          </p:cNvPr>
-          <p:cNvSpPr>
-            <a:spLocks noGrp="1"/>
-          </p:cNvSpPr>
-          <p:nvPr>
-            <p:ph idx="1"/>
-          </p:nvPr>
-        </p:nvSpPr>
-        <p:spPr/>
-        <p:txBody>
-          <a:bodyPr/>
-          <a:lstStyle/>
-          <a:p>
-            <a:endParaRPr lang="en-CA"/>
-          </a:p>
-        </p:txBody>
-      </p:sp>
-      <p:sp>
-        <p:nvSpPr>
           <p:cNvPr id="4" name="Date Placeholder 3">
             <a:extLst>
               <a:ext uri="{FF2B5EF4-FFF2-40B4-BE49-F238E27FC236}">
@@ -20736,6 +20795,65 @@
               <a:t>16</a:t>
             </a:fld>
             <a:endParaRPr lang="en-US" dirty="0"/>
+          </a:p>
+        </p:txBody>
+      </p:sp>
+      <p:sp>
+        <p:nvSpPr>
+          <p:cNvPr id="7" name="Content Placeholder 2">
+            <a:extLst>
+              <a:ext uri="{FF2B5EF4-FFF2-40B4-BE49-F238E27FC236}">
+                <a16:creationId xmlns:a16="http://schemas.microsoft.com/office/drawing/2014/main" id="{C8D5885D-0094-4A96-96E6-A1AD76FD3B22}"/>
+              </a:ext>
+            </a:extLst>
+          </p:cNvPr>
+          <p:cNvSpPr>
+            <a:spLocks noGrp="1"/>
+          </p:cNvSpPr>
+          <p:nvPr>
+            <p:ph idx="1"/>
+          </p:nvPr>
+        </p:nvSpPr>
+        <p:spPr>
+          <a:xfrm>
+            <a:off x="1096963" y="2108200"/>
+            <a:ext cx="10058400" cy="3760788"/>
+          </a:xfrm>
+        </p:spPr>
+        <p:txBody>
+          <a:bodyPr>
+            <a:normAutofit/>
+          </a:bodyPr>
+          <a:lstStyle/>
+          <a:p>
+            <a:pPr>
+              <a:buFont typeface="Wingdings" panose="05000000000000000000" pitchFamily="2" charset="2"/>
+              <a:buChar char="«"/>
+            </a:pPr>
+            <a:r>
+              <a:rPr lang="en-CA" sz="2800" dirty="0"/>
+              <a:t>Train and Test ML models on larger dataset</a:t>
+            </a:r>
+          </a:p>
+          <a:p>
+            <a:pPr>
+              <a:buFont typeface="Wingdings" panose="05000000000000000000" pitchFamily="2" charset="2"/>
+              <a:buChar char="«"/>
+            </a:pPr>
+            <a:r>
+              <a:rPr lang="en-CA" sz="2800" dirty="0"/>
+              <a:t>Find a viable solution for running the neural network machine learning model</a:t>
+            </a:r>
+          </a:p>
+          <a:p>
+            <a:pPr>
+              <a:buFont typeface="Wingdings" panose="05000000000000000000" pitchFamily="2" charset="2"/>
+              <a:buChar char="«"/>
+            </a:pPr>
+            <a:r>
+              <a:rPr lang="en-CA" sz="2800" dirty="0"/>
+              <a:t>After a successful run of the neural network machine learning model, apply the model to different datasets (e.g. amazon reviews, IMDb reviews, Google reviews) to see its effectiveness in predicting sentiment when applied to different data</a:t>
+            </a:r>
           </a:p>
         </p:txBody>
       </p:sp>
@@ -20792,7 +20910,7 @@
           <a:p>
             <a:r>
               <a:rPr lang="en-US" dirty="0"/>
-              <a:t>Questions?</a:t>
+              <a:t>Thank you!</a:t>
             </a:r>
             <a:endParaRPr lang="en-CA" dirty="0"/>
           </a:p>
@@ -20882,6 +21000,48 @@
               <a:t>17</a:t>
             </a:fld>
             <a:endParaRPr lang="en-US" dirty="0"/>
+          </a:p>
+        </p:txBody>
+      </p:sp>
+      <p:sp>
+        <p:nvSpPr>
+          <p:cNvPr id="7" name="Content Placeholder 2">
+            <a:extLst>
+              <a:ext uri="{FF2B5EF4-FFF2-40B4-BE49-F238E27FC236}">
+                <a16:creationId xmlns:a16="http://schemas.microsoft.com/office/drawing/2014/main" id="{9FEC2709-46E0-44D2-91D3-82460D305D8C}"/>
+              </a:ext>
+            </a:extLst>
+          </p:cNvPr>
+          <p:cNvSpPr>
+            <a:spLocks noGrp="1"/>
+          </p:cNvSpPr>
+          <p:nvPr>
+            <p:ph idx="1"/>
+          </p:nvPr>
+        </p:nvSpPr>
+        <p:spPr>
+          <a:xfrm>
+            <a:off x="1096963" y="2108200"/>
+            <a:ext cx="10058400" cy="3760788"/>
+          </a:xfrm>
+        </p:spPr>
+        <p:txBody>
+          <a:bodyPr>
+            <a:normAutofit/>
+          </a:bodyPr>
+          <a:lstStyle/>
+          <a:p>
+            <a:pPr marL="0" indent="0">
+              <a:buNone/>
+            </a:pPr>
+            <a:r>
+              <a:rPr lang="en-CA" sz="13800" dirty="0">
+                <a:solidFill>
+                  <a:srgbClr val="BF2419"/>
+                </a:solidFill>
+              </a:rPr>
+              <a:t>Questions?</a:t>
+            </a:r>
           </a:p>
         </p:txBody>
       </p:sp>
@@ -23581,21 +23741,21 @@
 </file>
 
 <file path=customXml/item1.xml><?xml version="1.0" encoding="utf-8"?>
+<?mso-contentType ?>
+<FormTemplates xmlns="http://schemas.microsoft.com/sharepoint/v3/contenttype/forms">
+  <Display>DocumentLibraryForm</Display>
+  <Edit>DocumentLibraryForm</Edit>
+  <New>DocumentLibraryForm</New>
+</FormTemplates>
+</file>
+
+<file path=customXml/item2.xml><?xml version="1.0" encoding="utf-8"?>
 <p:properties xmlns:p="http://schemas.microsoft.com/office/2006/metadata/properties" xmlns:xsi="http://www.w3.org/2001/XMLSchema-instance" xmlns:pc="http://schemas.microsoft.com/office/infopath/2007/PartnerControls">
   <documentManagement>
     <Status xmlns="71af3243-3dd4-4a8d-8c0d-dd76da1f02a5">Not started</Status>
     <MediaServiceKeyPoints xmlns="71af3243-3dd4-4a8d-8c0d-dd76da1f02a5" xsi:nil="true"/>
   </documentManagement>
 </p:properties>
-</file>
-
-<file path=customXml/item2.xml><?xml version="1.0" encoding="utf-8"?>
-<?mso-contentType ?>
-<FormTemplates xmlns="http://schemas.microsoft.com/sharepoint/v3/contenttype/forms">
-  <Display>DocumentLibraryForm</Display>
-  <Edit>DocumentLibraryForm</Edit>
-  <New>DocumentLibraryForm</New>
-</FormTemplates>
 </file>
 
 <file path=customXml/item3.xml><?xml version="1.0" encoding="utf-8"?>
@@ -23820,19 +23980,19 @@
 </file>
 
 <file path=customXml/itemProps1.xml><?xml version="1.0" encoding="utf-8"?>
+<ds:datastoreItem xmlns:ds="http://schemas.openxmlformats.org/officeDocument/2006/customXml" ds:itemID="{2E5ECA37-C458-4BA2-A090-D7A19E07B434}">
+  <ds:schemaRefs>
+    <ds:schemaRef ds:uri="http://schemas.microsoft.com/sharepoint/v3/contenttype/forms"/>
+  </ds:schemaRefs>
+</ds:datastoreItem>
+</file>
+
+<file path=customXml/itemProps2.xml><?xml version="1.0" encoding="utf-8"?>
 <ds:datastoreItem xmlns:ds="http://schemas.openxmlformats.org/officeDocument/2006/customXml" ds:itemID="{84F503EC-3FFF-4193-A86F-39150E2BAC75}">
   <ds:schemaRefs>
     <ds:schemaRef ds:uri="http://schemas.microsoft.com/office/2006/metadata/properties"/>
     <ds:schemaRef ds:uri="http://schemas.microsoft.com/office/infopath/2007/PartnerControls"/>
     <ds:schemaRef ds:uri="71af3243-3dd4-4a8d-8c0d-dd76da1f02a5"/>
-  </ds:schemaRefs>
-</ds:datastoreItem>
-</file>
-
-<file path=customXml/itemProps2.xml><?xml version="1.0" encoding="utf-8"?>
-<ds:datastoreItem xmlns:ds="http://schemas.openxmlformats.org/officeDocument/2006/customXml" ds:itemID="{2E5ECA37-C458-4BA2-A090-D7A19E07B434}">
-  <ds:schemaRefs>
-    <ds:schemaRef ds:uri="http://schemas.microsoft.com/sharepoint/v3/contenttype/forms"/>
   </ds:schemaRefs>
 </ds:datastoreItem>
 </file>

</xml_diff>